<commit_message>
lex week 2 lecture slides done
</commit_message>
<xml_diff>
--- a/assets/ppt/lex/lex3-regexps-are-trees.pptx
+++ b/assets/ppt/lex/lex3-regexps-are-trees.pptx
@@ -2026,7 +2026,7 @@
           <a:p>
             <a:fld id="{1B6DC762-1116-2146-A47C-D79A5A5DBAFD}" type="datetime1">
               <a:rPr lang="en-CA" smtClean="0"/>
-              <a:t>2020-09-16</a:t>
+              <a:t>2020-09-17</a:t>
             </a:fld>
             <a:endParaRPr lang="en-US"/>
           </a:p>
@@ -2224,7 +2224,7 @@
           <a:p>
             <a:fld id="{725FEDD1-5A1B-2342-BAF0-F7C5511A73CE}" type="datetime1">
               <a:rPr lang="en-CA" smtClean="0"/>
-              <a:t>2020-09-16</a:t>
+              <a:t>2020-09-17</a:t>
             </a:fld>
             <a:endParaRPr lang="en-US"/>
           </a:p>
@@ -2432,7 +2432,7 @@
           <a:p>
             <a:fld id="{F09E59AE-0AE1-4048-8BD6-D39FC0EBB194}" type="datetime1">
               <a:rPr lang="en-CA" smtClean="0"/>
-              <a:t>2020-09-16</a:t>
+              <a:t>2020-09-17</a:t>
             </a:fld>
             <a:endParaRPr lang="en-US"/>
           </a:p>
@@ -3907,7 +3907,7 @@
           <a:p>
             <a:fld id="{A2849525-9B7D-5945-A782-775278635E42}" type="datetime1">
               <a:rPr lang="en-CA" smtClean="0"/>
-              <a:t>2020-09-16</a:t>
+              <a:t>2020-09-17</a:t>
             </a:fld>
             <a:endParaRPr lang="en-US"/>
           </a:p>
@@ -4182,7 +4182,7 @@
           <a:p>
             <a:fld id="{D05E1499-BDD1-6940-8C79-13A8B8E63D57}" type="datetime1">
               <a:rPr lang="en-CA" smtClean="0"/>
-              <a:t>2020-09-16</a:t>
+              <a:t>2020-09-17</a:t>
             </a:fld>
             <a:endParaRPr lang="en-US"/>
           </a:p>
@@ -4447,7 +4447,7 @@
           <a:p>
             <a:fld id="{17E70EF3-18A7-4644-8DA2-1EB9CA66C736}" type="datetime1">
               <a:rPr lang="en-CA" smtClean="0"/>
-              <a:t>2020-09-16</a:t>
+              <a:t>2020-09-17</a:t>
             </a:fld>
             <a:endParaRPr lang="en-US"/>
           </a:p>
@@ -4859,7 +4859,7 @@
           <a:p>
             <a:fld id="{54538FC1-2481-FB4A-91E5-87F3422DE2D5}" type="datetime1">
               <a:rPr lang="en-CA" smtClean="0"/>
-              <a:t>2020-09-16</a:t>
+              <a:t>2020-09-17</a:t>
             </a:fld>
             <a:endParaRPr lang="en-US"/>
           </a:p>
@@ -5000,7 +5000,7 @@
           <a:p>
             <a:fld id="{93D5C515-1622-C840-89B2-A4A55D34866A}" type="datetime1">
               <a:rPr lang="en-CA" smtClean="0"/>
-              <a:t>2020-09-16</a:t>
+              <a:t>2020-09-17</a:t>
             </a:fld>
             <a:endParaRPr lang="en-US"/>
           </a:p>
@@ -5113,7 +5113,7 @@
           <a:p>
             <a:fld id="{B9077E75-6C88-BB47-AC6F-0DCA859E7113}" type="datetime1">
               <a:rPr lang="en-CA" smtClean="0"/>
-              <a:t>2020-09-16</a:t>
+              <a:t>2020-09-17</a:t>
             </a:fld>
             <a:endParaRPr lang="en-US"/>
           </a:p>
@@ -5424,7 +5424,7 @@
           <a:p>
             <a:fld id="{1AD12F8B-7E05-A047-BAC3-EE71BEBBE5BE}" type="datetime1">
               <a:rPr lang="en-CA" smtClean="0"/>
-              <a:t>2020-09-16</a:t>
+              <a:t>2020-09-17</a:t>
             </a:fld>
             <a:endParaRPr lang="en-US"/>
           </a:p>
@@ -5712,7 +5712,7 @@
           <a:p>
             <a:fld id="{C1D9F72A-E93E-B546-8268-6408A6E1DA62}" type="datetime1">
               <a:rPr lang="en-CA" smtClean="0"/>
-              <a:t>2020-09-16</a:t>
+              <a:t>2020-09-17</a:t>
             </a:fld>
             <a:endParaRPr lang="en-US"/>
           </a:p>
@@ -5953,7 +5953,7 @@
           <a:p>
             <a:fld id="{97DF4AC7-DB73-7444-A2A7-FD79FE1A2B2B}" type="datetime1">
               <a:rPr lang="en-CA" smtClean="0"/>
-              <a:t>2020-09-16</a:t>
+              <a:t>2020-09-17</a:t>
             </a:fld>
             <a:endParaRPr lang="en-US"/>
           </a:p>
@@ -6384,10 +6384,6 @@
           </p:nvPr>
         </p:nvSpPr>
         <p:spPr>
-          <a:xfrm>
-            <a:off x="1376781" y="744575"/>
-            <a:ext cx="6390450" cy="2052675"/>
-          </a:xfrm>
           <a:prstGeom prst="rect">
             <a:avLst/>
           </a:prstGeom>
@@ -6406,7 +6402,7 @@
               <a:buSzPct val="25000"/>
             </a:pPr>
             <a:r>
-              <a:rPr lang="en-US" sz="3300">
+              <a:rPr lang="en-US" sz="3300" dirty="0">
                 <a:latin typeface="Calibri"/>
                 <a:ea typeface="Calibri"/>
                 <a:cs typeface="Calibri"/>
@@ -6428,10 +6424,6 @@
           </p:nvPr>
         </p:nvSpPr>
         <p:spPr>
-          <a:xfrm>
-            <a:off x="1376775" y="2834114"/>
-            <a:ext cx="6390450" cy="1300500"/>
-          </a:xfrm>
           <a:prstGeom prst="rect">
             <a:avLst/>
           </a:prstGeom>
@@ -6453,7 +6445,7 @@
               <a:buSzPct val="25000"/>
             </a:pPr>
             <a:r>
-              <a:rPr lang="en-US" sz="2400">
+              <a:rPr lang="en-US" sz="2400" dirty="0">
                 <a:solidFill>
                   <a:srgbClr val="888888"/>
                 </a:solidFill>
@@ -6476,7 +6468,7 @@
               <a:buSzPct val="25000"/>
             </a:pPr>
             <a:r>
-              <a:rPr lang="en-US" sz="2400">
+              <a:rPr lang="en-US" sz="2400" dirty="0">
                 <a:solidFill>
                   <a:srgbClr val="888888"/>
                 </a:solidFill>
@@ -6499,7 +6491,7 @@
               <a:buSzPct val="25000"/>
             </a:pPr>
             <a:r>
-              <a:rPr lang="en-US" sz="1800">
+              <a:rPr lang="en-US" sz="1800" dirty="0" err="1">
                 <a:solidFill>
                   <a:srgbClr val="888888"/>
                 </a:solidFill>
@@ -6508,7 +6500,19 @@
                 <a:cs typeface="Calibri"/>
                 <a:sym typeface="Calibri"/>
               </a:rPr>
-              <a:t>anoopsarkar.github.io/compilers-class</a:t>
+              <a:t>anoopsarkar.github.io</a:t>
+            </a:r>
+            <a:r>
+              <a:rPr lang="en-US" sz="1800" dirty="0">
+                <a:solidFill>
+                  <a:srgbClr val="888888"/>
+                </a:solidFill>
+                <a:latin typeface="Calibri"/>
+                <a:ea typeface="Calibri"/>
+                <a:cs typeface="Calibri"/>
+                <a:sym typeface="Calibri"/>
+              </a:rPr>
+              <a:t>/compilers-class</a:t>
             </a:r>
           </a:p>
         </p:txBody>

</xml_diff>

<commit_message>
updated lex3 and lex8 slides
</commit_message>
<xml_diff>
--- a/assets/ppt/lex/lex3-regexps-are-trees.pptx
+++ b/assets/ppt/lex/lex3-regexps-are-trees.pptx
@@ -5,7 +5,7 @@
     <p:sldMasterId id="2147483673" r:id="rId1"/>
   </p:sldMasterIdLst>
   <p:notesMasterIdLst>
-    <p:notesMasterId r:id="rId10"/>
+    <p:notesMasterId r:id="rId11"/>
   </p:notesMasterIdLst>
   <p:sldIdLst>
     <p:sldId id="256" r:id="rId2"/>
@@ -15,7 +15,8 @@
     <p:sldId id="265" r:id="rId6"/>
     <p:sldId id="266" r:id="rId7"/>
     <p:sldId id="260" r:id="rId8"/>
-    <p:sldId id="261" r:id="rId9"/>
+    <p:sldId id="267" r:id="rId9"/>
+    <p:sldId id="261" r:id="rId10"/>
   </p:sldIdLst>
   <p:sldSz cx="9144000" cy="5143500" type="screen16x9"/>
   <p:notesSz cx="6858000" cy="9144000"/>
@@ -1684,6 +1685,211 @@
   <p:cSld>
     <p:spTree>
       <p:nvGrpSpPr>
+        <p:cNvPr id="1" name="Shape 202"/>
+        <p:cNvGrpSpPr/>
+        <p:nvPr/>
+      </p:nvGrpSpPr>
+      <p:grpSpPr>
+        <a:xfrm>
+          <a:off x="0" y="0"/>
+          <a:ext cx="0" cy="0"/>
+          <a:chOff x="0" y="0"/>
+          <a:chExt cx="0" cy="0"/>
+        </a:xfrm>
+      </p:grpSpPr>
+      <p:sp>
+        <p:nvSpPr>
+          <p:cNvPr id="203" name="Shape 203"/>
+          <p:cNvSpPr txBox="1">
+            <a:spLocks noGrp="1"/>
+          </p:cNvSpPr>
+          <p:nvPr>
+            <p:ph type="sldNum" idx="12"/>
+          </p:nvPr>
+        </p:nvSpPr>
+        <p:spPr>
+          <a:xfrm>
+            <a:off x="3886200" y="8686800"/>
+            <a:ext cx="2971799" cy="457200"/>
+          </a:xfrm>
+          <a:prstGeom prst="rect">
+            <a:avLst/>
+          </a:prstGeom>
+          <a:noFill/>
+          <a:ln>
+            <a:noFill/>
+          </a:ln>
+        </p:spPr>
+        <p:txBody>
+          <a:bodyPr lIns="91425" tIns="45700" rIns="91425" bIns="45700" anchor="b" anchorCtr="0">
+            <a:noAutofit/>
+          </a:bodyPr>
+          <a:lstStyle/>
+          <a:p>
+            <a:pPr marL="0" marR="0" lvl="0" indent="0" algn="r" rtl="0">
+              <a:spcBef>
+                <a:spcPts val="0"/>
+              </a:spcBef>
+              <a:spcAft>
+                <a:spcPts val="0"/>
+              </a:spcAft>
+              <a:buSzPct val="25000"/>
+              <a:buNone/>
+            </a:pPr>
+            <a:fld id="{00000000-1234-1234-1234-123412341234}" type="slidenum">
+              <a:rPr lang="en-US" sz="1200">
+                <a:solidFill>
+                  <a:schemeClr val="dk1"/>
+                </a:solidFill>
+                <a:latin typeface="Calibri"/>
+                <a:ea typeface="Calibri"/>
+                <a:cs typeface="Calibri"/>
+                <a:sym typeface="Calibri"/>
+              </a:rPr>
+              <a:t>8</a:t>
+            </a:fld>
+            <a:endParaRPr lang="en-US" sz="1200">
+              <a:solidFill>
+                <a:schemeClr val="dk1"/>
+              </a:solidFill>
+              <a:latin typeface="Calibri"/>
+              <a:ea typeface="Calibri"/>
+              <a:cs typeface="Calibri"/>
+              <a:sym typeface="Calibri"/>
+            </a:endParaRPr>
+          </a:p>
+        </p:txBody>
+      </p:sp>
+      <p:sp>
+        <p:nvSpPr>
+          <p:cNvPr id="204" name="Shape 204"/>
+          <p:cNvSpPr>
+            <a:spLocks noGrp="1" noRot="1" noChangeAspect="1"/>
+          </p:cNvSpPr>
+          <p:nvPr>
+            <p:ph type="sldImg" idx="2"/>
+          </p:nvPr>
+        </p:nvSpPr>
+        <p:spPr>
+          <a:xfrm>
+            <a:off x="381000" y="685800"/>
+            <a:ext cx="6096000" cy="3429000"/>
+          </a:xfrm>
+          <a:custGeom>
+            <a:avLst/>
+            <a:gdLst/>
+            <a:ahLst/>
+            <a:cxnLst/>
+            <a:rect l="0" t="0" r="0" b="0"/>
+            <a:pathLst>
+              <a:path w="120000" h="120000" extrusionOk="0">
+                <a:moveTo>
+                  <a:pt x="0" y="0"/>
+                </a:moveTo>
+                <a:lnTo>
+                  <a:pt x="120000" y="0"/>
+                </a:lnTo>
+                <a:lnTo>
+                  <a:pt x="120000" y="120000"/>
+                </a:lnTo>
+                <a:lnTo>
+                  <a:pt x="0" y="120000"/>
+                </a:lnTo>
+                <a:close/>
+              </a:path>
+            </a:pathLst>
+          </a:custGeom>
+          <a:solidFill>
+            <a:srgbClr val="FFFFFF"/>
+          </a:solidFill>
+          <a:ln w="9525" cap="flat" cmpd="sng">
+            <a:solidFill>
+              <a:srgbClr val="000000"/>
+            </a:solidFill>
+            <a:prstDash val="solid"/>
+            <a:miter/>
+            <a:headEnd type="none" w="med" len="med"/>
+            <a:tailEnd type="none" w="med" len="med"/>
+          </a:ln>
+        </p:spPr>
+      </p:sp>
+      <p:sp>
+        <p:nvSpPr>
+          <p:cNvPr id="205" name="Shape 205"/>
+          <p:cNvSpPr txBox="1">
+            <a:spLocks noGrp="1"/>
+          </p:cNvSpPr>
+          <p:nvPr>
+            <p:ph type="body" idx="1"/>
+          </p:nvPr>
+        </p:nvSpPr>
+        <p:spPr>
+          <a:xfrm>
+            <a:off x="914400" y="4343400"/>
+            <a:ext cx="5029199" cy="4114800"/>
+          </a:xfrm>
+          <a:prstGeom prst="rect">
+            <a:avLst/>
+          </a:prstGeom>
+          <a:solidFill>
+            <a:srgbClr val="FFFFFF"/>
+          </a:solidFill>
+          <a:ln w="9525" cap="flat" cmpd="sng">
+            <a:solidFill>
+              <a:srgbClr val="000000"/>
+            </a:solidFill>
+            <a:prstDash val="solid"/>
+            <a:miter/>
+            <a:headEnd type="none" w="med" len="med"/>
+            <a:tailEnd type="none" w="med" len="med"/>
+          </a:ln>
+        </p:spPr>
+        <p:txBody>
+          <a:bodyPr lIns="91425" tIns="45700" rIns="91425" bIns="45700" anchor="t" anchorCtr="0">
+            <a:noAutofit/>
+          </a:bodyPr>
+          <a:lstStyle/>
+          <a:p>
+            <a:pPr marL="0" marR="0" lvl="0" indent="0" algn="l" rtl="0">
+              <a:spcBef>
+                <a:spcPts val="0"/>
+              </a:spcBef>
+              <a:spcAft>
+                <a:spcPts val="0"/>
+              </a:spcAft>
+              <a:buSzPct val="25000"/>
+              <a:buNone/>
+            </a:pPr>
+            <a:endParaRPr sz="1200" b="0" i="0" u="none" strike="noStrike" cap="none">
+              <a:solidFill>
+                <a:schemeClr val="dk1"/>
+              </a:solidFill>
+              <a:latin typeface="Calibri"/>
+              <a:ea typeface="Calibri"/>
+              <a:cs typeface="Calibri"/>
+              <a:sym typeface="Calibri"/>
+            </a:endParaRPr>
+          </a:p>
+        </p:txBody>
+      </p:sp>
+    </p:spTree>
+    <p:extLst>
+      <p:ext uri="{BB962C8B-B14F-4D97-AF65-F5344CB8AC3E}">
+        <p14:creationId xmlns:p14="http://schemas.microsoft.com/office/powerpoint/2010/main" val="3701555801"/>
+      </p:ext>
+    </p:extLst>
+  </p:cSld>
+  <p:clrMapOvr>
+    <a:masterClrMapping/>
+  </p:clrMapOvr>
+</p:notes>
+</file>
+
+<file path=ppt/notesSlides/notesSlide5.xml><?xml version="1.0" encoding="utf-8"?>
+<p:notes xmlns:a="http://schemas.openxmlformats.org/drawingml/2006/main" xmlns:r="http://schemas.openxmlformats.org/officeDocument/2006/relationships" xmlns:p="http://schemas.openxmlformats.org/presentationml/2006/main" showMasterSp="0" showMasterPhAnim="0">
+  <p:cSld>
+    <p:spTree>
+      <p:nvGrpSpPr>
         <p:cNvPr id="1" name="Shape 212"/>
         <p:cNvGrpSpPr/>
         <p:nvPr/>
@@ -1745,7 +1951,7 @@
                 <a:cs typeface="Calibri"/>
                 <a:sym typeface="Calibri"/>
               </a:rPr>
-              <a:t>8</a:t>
+              <a:t>9</a:t>
             </a:fld>
             <a:endParaRPr lang="en-US" sz="1200">
               <a:solidFill>
@@ -2026,7 +2232,7 @@
           <a:p>
             <a:fld id="{1B6DC762-1116-2146-A47C-D79A5A5DBAFD}" type="datetime1">
               <a:rPr lang="en-CA" smtClean="0"/>
-              <a:t>2020-09-17</a:t>
+              <a:t>2020-09-18</a:t>
             </a:fld>
             <a:endParaRPr lang="en-US"/>
           </a:p>
@@ -2224,7 +2430,7 @@
           <a:p>
             <a:fld id="{725FEDD1-5A1B-2342-BAF0-F7C5511A73CE}" type="datetime1">
               <a:rPr lang="en-CA" smtClean="0"/>
-              <a:t>2020-09-17</a:t>
+              <a:t>2020-09-18</a:t>
             </a:fld>
             <a:endParaRPr lang="en-US"/>
           </a:p>
@@ -2432,7 +2638,7 @@
           <a:p>
             <a:fld id="{F09E59AE-0AE1-4048-8BD6-D39FC0EBB194}" type="datetime1">
               <a:rPr lang="en-CA" smtClean="0"/>
-              <a:t>2020-09-17</a:t>
+              <a:t>2020-09-18</a:t>
             </a:fld>
             <a:endParaRPr lang="en-US"/>
           </a:p>
@@ -3907,7 +4113,7 @@
           <a:p>
             <a:fld id="{A2849525-9B7D-5945-A782-775278635E42}" type="datetime1">
               <a:rPr lang="en-CA" smtClean="0"/>
-              <a:t>2020-09-17</a:t>
+              <a:t>2020-09-18</a:t>
             </a:fld>
             <a:endParaRPr lang="en-US"/>
           </a:p>
@@ -4182,7 +4388,7 @@
           <a:p>
             <a:fld id="{D05E1499-BDD1-6940-8C79-13A8B8E63D57}" type="datetime1">
               <a:rPr lang="en-CA" smtClean="0"/>
-              <a:t>2020-09-17</a:t>
+              <a:t>2020-09-18</a:t>
             </a:fld>
             <a:endParaRPr lang="en-US"/>
           </a:p>
@@ -4447,7 +4653,7 @@
           <a:p>
             <a:fld id="{17E70EF3-18A7-4644-8DA2-1EB9CA66C736}" type="datetime1">
               <a:rPr lang="en-CA" smtClean="0"/>
-              <a:t>2020-09-17</a:t>
+              <a:t>2020-09-18</a:t>
             </a:fld>
             <a:endParaRPr lang="en-US"/>
           </a:p>
@@ -4859,7 +5065,7 @@
           <a:p>
             <a:fld id="{54538FC1-2481-FB4A-91E5-87F3422DE2D5}" type="datetime1">
               <a:rPr lang="en-CA" smtClean="0"/>
-              <a:t>2020-09-17</a:t>
+              <a:t>2020-09-18</a:t>
             </a:fld>
             <a:endParaRPr lang="en-US"/>
           </a:p>
@@ -5000,7 +5206,7 @@
           <a:p>
             <a:fld id="{93D5C515-1622-C840-89B2-A4A55D34866A}" type="datetime1">
               <a:rPr lang="en-CA" smtClean="0"/>
-              <a:t>2020-09-17</a:t>
+              <a:t>2020-09-18</a:t>
             </a:fld>
             <a:endParaRPr lang="en-US"/>
           </a:p>
@@ -5113,7 +5319,7 @@
           <a:p>
             <a:fld id="{B9077E75-6C88-BB47-AC6F-0DCA859E7113}" type="datetime1">
               <a:rPr lang="en-CA" smtClean="0"/>
-              <a:t>2020-09-17</a:t>
+              <a:t>2020-09-18</a:t>
             </a:fld>
             <a:endParaRPr lang="en-US"/>
           </a:p>
@@ -5424,7 +5630,7 @@
           <a:p>
             <a:fld id="{1AD12F8B-7E05-A047-BAC3-EE71BEBBE5BE}" type="datetime1">
               <a:rPr lang="en-CA" smtClean="0"/>
-              <a:t>2020-09-17</a:t>
+              <a:t>2020-09-18</a:t>
             </a:fld>
             <a:endParaRPr lang="en-US"/>
           </a:p>
@@ -5712,7 +5918,7 @@
           <a:p>
             <a:fld id="{C1D9F72A-E93E-B546-8268-6408A6E1DA62}" type="datetime1">
               <a:rPr lang="en-CA" smtClean="0"/>
-              <a:t>2020-09-17</a:t>
+              <a:t>2020-09-18</a:t>
             </a:fld>
             <a:endParaRPr lang="en-US"/>
           </a:p>
@@ -5953,7 +6159,7 @@
           <a:p>
             <a:fld id="{97DF4AC7-DB73-7444-A2A7-FD79FE1A2B2B}" type="datetime1">
               <a:rPr lang="en-CA" smtClean="0"/>
-              <a:t>2020-09-17</a:t>
+              <a:t>2020-09-18</a:t>
             </a:fld>
             <a:endParaRPr lang="en-US"/>
           </a:p>
@@ -10167,7 +10373,7 @@
                   <a:latin typeface="Consolas" panose="020B0609020204030204" pitchFamily="49" charset="0"/>
                   <a:cs typeface="Consolas" panose="020B0609020204030204" pitchFamily="49" charset="0"/>
                 </a:rPr>
-                <a:t>(*(*a))</a:t>
+                <a:t>((a*)*)</a:t>
               </a:r>
             </a:p>
           </p:txBody>
@@ -10734,7 +10940,7 @@
                   <a:latin typeface="Consolas" panose="020B0609020204030204" pitchFamily="49" charset="0"/>
                   <a:cs typeface="Consolas" panose="020B0609020204030204" pitchFamily="49" charset="0"/>
                 </a:rPr>
-                <a:t>(.(.ab)c)</a:t>
+                <a:t>((ab)c)</a:t>
               </a:r>
             </a:p>
           </p:txBody>
@@ -10987,7 +11193,7 @@
                             </p:stCondLst>
                             <p:childTnLst>
                               <p:par>
-                                <p:cTn id="13" presetID="1" presetClass="entr" presetSubtype="0" fill="hold" grpId="0" nodeType="clickEffect">
+                                <p:cTn id="13" presetID="1" presetClass="entr" presetSubtype="0" fill="hold" nodeType="clickEffect">
                                   <p:stCondLst>
                                     <p:cond delay="0"/>
                                   </p:stCondLst>
@@ -11000,7 +11206,7 @@
                                           </p:stCondLst>
                                         </p:cTn>
                                         <p:tgtEl>
-                                          <p:spTgt spid="77"/>
+                                          <p:spTgt spid="76"/>
                                         </p:tgtEl>
                                         <p:attrNameLst>
                                           <p:attrName>style.visibility</p:attrName>
@@ -11040,6 +11246,51 @@
                                     <p:set>
                                       <p:cBhvr>
                                         <p:cTn id="18" dur="1" fill="hold">
+                                          <p:stCondLst>
+                                            <p:cond delay="0"/>
+                                          </p:stCondLst>
+                                        </p:cTn>
+                                        <p:tgtEl>
+                                          <p:spTgt spid="77"/>
+                                        </p:tgtEl>
+                                        <p:attrNameLst>
+                                          <p:attrName>style.visibility</p:attrName>
+                                        </p:attrNameLst>
+                                      </p:cBhvr>
+                                      <p:to>
+                                        <p:strVal val="visible"/>
+                                      </p:to>
+                                    </p:set>
+                                  </p:childTnLst>
+                                </p:cTn>
+                              </p:par>
+                            </p:childTnLst>
+                          </p:cTn>
+                        </p:par>
+                      </p:childTnLst>
+                    </p:cTn>
+                  </p:par>
+                  <p:par>
+                    <p:cTn id="19" fill="hold">
+                      <p:stCondLst>
+                        <p:cond delay="indefinite"/>
+                      </p:stCondLst>
+                      <p:childTnLst>
+                        <p:par>
+                          <p:cTn id="20" fill="hold">
+                            <p:stCondLst>
+                              <p:cond delay="0"/>
+                            </p:stCondLst>
+                            <p:childTnLst>
+                              <p:par>
+                                <p:cTn id="21" presetID="1" presetClass="entr" presetSubtype="0" fill="hold" grpId="0" nodeType="clickEffect">
+                                  <p:stCondLst>
+                                    <p:cond delay="0"/>
+                                  </p:stCondLst>
+                                  <p:childTnLst>
+                                    <p:set>
+                                      <p:cBhvr>
+                                        <p:cTn id="22" dur="1" fill="hold">
                                           <p:stCondLst>
                                             <p:cond delay="0"/>
                                           </p:stCondLst>
@@ -12496,6 +12747,248 @@
   <p:cSld>
     <p:spTree>
       <p:nvGrpSpPr>
+        <p:cNvPr id="1" name="Shape 206"/>
+        <p:cNvGrpSpPr/>
+        <p:nvPr/>
+      </p:nvGrpSpPr>
+      <p:grpSpPr>
+        <a:xfrm>
+          <a:off x="0" y="0"/>
+          <a:ext cx="0" cy="0"/>
+          <a:chOff x="0" y="0"/>
+          <a:chExt cx="0" cy="0"/>
+        </a:xfrm>
+      </p:grpSpPr>
+      <p:sp>
+        <p:nvSpPr>
+          <p:cNvPr id="208" name="Shape 208"/>
+          <p:cNvSpPr txBox="1">
+            <a:spLocks noGrp="1"/>
+          </p:cNvSpPr>
+          <p:nvPr>
+            <p:ph type="title"/>
+          </p:nvPr>
+        </p:nvSpPr>
+        <p:spPr>
+          <a:prstGeom prst="rect">
+            <a:avLst/>
+          </a:prstGeom>
+          <a:noFill/>
+          <a:ln>
+            <a:noFill/>
+          </a:ln>
+        </p:spPr>
+        <p:txBody>
+          <a:bodyPr lIns="68569" tIns="34275" rIns="68569" bIns="34275" anchor="ctr" anchorCtr="0">
+            <a:noAutofit/>
+          </a:bodyPr>
+          <a:lstStyle/>
+          <a:p>
+            <a:pPr>
+              <a:buSzPct val="25000"/>
+            </a:pPr>
+            <a:r>
+              <a:rPr lang="en-US"/>
+              <a:t>Equivalence of Regexps</a:t>
+            </a:r>
+          </a:p>
+        </p:txBody>
+      </p:sp>
+      <p:sp>
+        <p:nvSpPr>
+          <p:cNvPr id="207" name="Shape 207"/>
+          <p:cNvSpPr txBox="1">
+            <a:spLocks noGrp="1"/>
+          </p:cNvSpPr>
+          <p:nvPr>
+            <p:ph type="sldNum" sz="quarter" idx="12"/>
+          </p:nvPr>
+        </p:nvSpPr>
+        <p:spPr>
+          <a:prstGeom prst="rect">
+            <a:avLst/>
+          </a:prstGeom>
+          <a:noFill/>
+          <a:ln>
+            <a:noFill/>
+          </a:ln>
+        </p:spPr>
+        <p:txBody>
+          <a:bodyPr lIns="68569" tIns="34275" rIns="68569" bIns="34275" anchor="t" anchorCtr="0">
+            <a:noAutofit/>
+          </a:bodyPr>
+          <a:lstStyle/>
+          <a:p>
+            <a:pPr algn="r">
+              <a:buSzPct val="25000"/>
+            </a:pPr>
+            <a:fld id="{00000000-1234-1234-1234-123412341234}" type="slidenum">
+              <a:rPr lang="en-US" sz="1050">
+                <a:solidFill>
+                  <a:schemeClr val="dk1"/>
+                </a:solidFill>
+                <a:latin typeface="Calibri"/>
+                <a:ea typeface="Calibri"/>
+                <a:cs typeface="Calibri"/>
+                <a:sym typeface="Calibri"/>
+              </a:rPr>
+              <a:pPr algn="r">
+                <a:buSzPct val="25000"/>
+              </a:pPr>
+              <a:t>8</a:t>
+            </a:fld>
+            <a:endParaRPr lang="en-US" sz="1050">
+              <a:solidFill>
+                <a:schemeClr val="dk1"/>
+              </a:solidFill>
+              <a:latin typeface="Calibri"/>
+              <a:ea typeface="Calibri"/>
+              <a:cs typeface="Calibri"/>
+              <a:sym typeface="Calibri"/>
+            </a:endParaRPr>
+          </a:p>
+        </p:txBody>
+      </p:sp>
+      <p:sp>
+        <p:nvSpPr>
+          <p:cNvPr id="211" name="Shape 211"/>
+          <p:cNvSpPr txBox="1"/>
+          <p:nvPr/>
+        </p:nvSpPr>
+        <p:spPr>
+          <a:xfrm>
+            <a:off x="2418586" y="4084364"/>
+            <a:ext cx="4306823" cy="564826"/>
+          </a:xfrm>
+          <a:prstGeom prst="rect">
+            <a:avLst/>
+          </a:prstGeom>
+          <a:solidFill>
+            <a:schemeClr val="accent1">
+              <a:lumMod val="75000"/>
+            </a:schemeClr>
+          </a:solidFill>
+          <a:ln>
+            <a:noFill/>
+          </a:ln>
+        </p:spPr>
+        <p:txBody>
+          <a:bodyPr lIns="68569" tIns="34275" rIns="68569" bIns="34275" anchor="t" anchorCtr="0">
+            <a:noAutofit/>
+          </a:bodyPr>
+          <a:lstStyle/>
+          <a:p>
+            <a:pPr>
+              <a:buClr>
+                <a:srgbClr val="FF0000"/>
+              </a:buClr>
+              <a:buSzPct val="25000"/>
+            </a:pPr>
+            <a:r>
+              <a:rPr lang="en-US" sz="3000" b="1" dirty="0">
+                <a:solidFill>
+                  <a:schemeClr val="bg1"/>
+                </a:solidFill>
+                <a:latin typeface="Calibri"/>
+                <a:ea typeface="Calibri"/>
+                <a:cs typeface="Calibri"/>
+                <a:sym typeface="Calibri"/>
+              </a:rPr>
+              <a:t>(0(10)*1)|(01)* == (01)* ?</a:t>
+            </a:r>
+          </a:p>
+        </p:txBody>
+      </p:sp>
+      <p:pic>
+        <p:nvPicPr>
+          <p:cNvPr id="9" name="Picture 8" descr="A close up of a device&#10;&#10;Description automatically generated">
+            <a:extLst>
+              <a:ext uri="{FF2B5EF4-FFF2-40B4-BE49-F238E27FC236}">
+                <a16:creationId xmlns:a16="http://schemas.microsoft.com/office/drawing/2014/main" id="{60CF5B05-3E7F-4140-87D6-45A9D0D9F681}"/>
+              </a:ext>
+            </a:extLst>
+          </p:cNvPr>
+          <p:cNvPicPr>
+            <a:picLocks noChangeAspect="1"/>
+          </p:cNvPicPr>
+          <p:nvPr/>
+        </p:nvPicPr>
+        <p:blipFill>
+          <a:blip r:embed="rId3"/>
+          <a:stretch>
+            <a:fillRect/>
+          </a:stretch>
+        </p:blipFill>
+        <p:spPr>
+          <a:xfrm>
+            <a:off x="2649980" y="1178003"/>
+            <a:ext cx="3844036" cy="2782148"/>
+          </a:xfrm>
+          <a:prstGeom prst="rect">
+            <a:avLst/>
+          </a:prstGeom>
+        </p:spPr>
+      </p:pic>
+      <p:sp>
+        <p:nvSpPr>
+          <p:cNvPr id="10" name="TextBox 9">
+            <a:extLst>
+              <a:ext uri="{FF2B5EF4-FFF2-40B4-BE49-F238E27FC236}">
+                <a16:creationId xmlns:a16="http://schemas.microsoft.com/office/drawing/2014/main" id="{7EF95D70-BB9C-AE49-97B7-61C9255787A0}"/>
+              </a:ext>
+            </a:extLst>
+          </p:cNvPr>
+          <p:cNvSpPr txBox="1"/>
+          <p:nvPr/>
+        </p:nvSpPr>
+        <p:spPr>
+          <a:xfrm>
+            <a:off x="7138050" y="617041"/>
+            <a:ext cx="1377300" cy="307777"/>
+          </a:xfrm>
+          <a:prstGeom prst="rect">
+            <a:avLst/>
+          </a:prstGeom>
+          <a:noFill/>
+        </p:spPr>
+        <p:txBody>
+          <a:bodyPr wrap="none" rtlCol="0">
+            <a:spAutoFit/>
+          </a:bodyPr>
+          <a:lstStyle/>
+          <a:p>
+            <a:r>
+              <a:rPr lang="en-US" dirty="0" err="1">
+                <a:latin typeface="Consolas" panose="020B0609020204030204" pitchFamily="49" charset="0"/>
+                <a:cs typeface="Consolas" panose="020B0609020204030204" pitchFamily="49" charset="0"/>
+              </a:rPr>
+              <a:t>debuggex.com</a:t>
+            </a:r>
+            <a:endParaRPr lang="en-US" dirty="0">
+              <a:latin typeface="Consolas" panose="020B0609020204030204" pitchFamily="49" charset="0"/>
+              <a:cs typeface="Consolas" panose="020B0609020204030204" pitchFamily="49" charset="0"/>
+            </a:endParaRPr>
+          </a:p>
+        </p:txBody>
+      </p:sp>
+    </p:spTree>
+    <p:extLst>
+      <p:ext uri="{BB962C8B-B14F-4D97-AF65-F5344CB8AC3E}">
+        <p14:creationId xmlns:p14="http://schemas.microsoft.com/office/powerpoint/2010/main" val="1923128138"/>
+      </p:ext>
+    </p:extLst>
+  </p:cSld>
+  <p:clrMapOvr>
+    <a:masterClrMapping/>
+  </p:clrMapOvr>
+</p:sld>
+</file>
+
+<file path=ppt/slides/slide9.xml><?xml version="1.0" encoding="utf-8"?>
+<p:sld xmlns:a="http://schemas.openxmlformats.org/drawingml/2006/main" xmlns:r="http://schemas.openxmlformats.org/officeDocument/2006/relationships" xmlns:p="http://schemas.openxmlformats.org/presentationml/2006/main">
+  <p:cSld>
+    <p:spTree>
+      <p:nvGrpSpPr>
         <p:cNvPr id="1" name="Shape 216"/>
         <p:cNvGrpSpPr/>
         <p:nvPr/>
@@ -12811,7 +13304,7 @@
               <a:pPr algn="r">
                 <a:buSzPct val="25000"/>
               </a:pPr>
-              <a:t>8</a:t>
+              <a:t>9</a:t>
             </a:fld>
             <a:endParaRPr lang="en-US" sz="1050">
               <a:solidFill>

</xml_diff>

<commit_message>
lex3, lex4, lex5, lex8 videos added
</commit_message>
<xml_diff>
--- a/assets/ppt/lex/lex3-regexps-are-trees.pptx
+++ b/assets/ppt/lex/lex3-regexps-are-trees.pptx
@@ -2232,7 +2232,7 @@
           <a:p>
             <a:fld id="{1B6DC762-1116-2146-A47C-D79A5A5DBAFD}" type="datetime1">
               <a:rPr lang="en-CA" smtClean="0"/>
-              <a:t>2020-09-18</a:t>
+              <a:t>2020-09-19</a:t>
             </a:fld>
             <a:endParaRPr lang="en-US"/>
           </a:p>
@@ -2430,7 +2430,7 @@
           <a:p>
             <a:fld id="{725FEDD1-5A1B-2342-BAF0-F7C5511A73CE}" type="datetime1">
               <a:rPr lang="en-CA" smtClean="0"/>
-              <a:t>2020-09-18</a:t>
+              <a:t>2020-09-19</a:t>
             </a:fld>
             <a:endParaRPr lang="en-US"/>
           </a:p>
@@ -2638,7 +2638,7 @@
           <a:p>
             <a:fld id="{F09E59AE-0AE1-4048-8BD6-D39FC0EBB194}" type="datetime1">
               <a:rPr lang="en-CA" smtClean="0"/>
-              <a:t>2020-09-18</a:t>
+              <a:t>2020-09-19</a:t>
             </a:fld>
             <a:endParaRPr lang="en-US"/>
           </a:p>
@@ -4113,7 +4113,7 @@
           <a:p>
             <a:fld id="{A2849525-9B7D-5945-A782-775278635E42}" type="datetime1">
               <a:rPr lang="en-CA" smtClean="0"/>
-              <a:t>2020-09-18</a:t>
+              <a:t>2020-09-19</a:t>
             </a:fld>
             <a:endParaRPr lang="en-US"/>
           </a:p>
@@ -4388,7 +4388,7 @@
           <a:p>
             <a:fld id="{D05E1499-BDD1-6940-8C79-13A8B8E63D57}" type="datetime1">
               <a:rPr lang="en-CA" smtClean="0"/>
-              <a:t>2020-09-18</a:t>
+              <a:t>2020-09-19</a:t>
             </a:fld>
             <a:endParaRPr lang="en-US"/>
           </a:p>
@@ -4653,7 +4653,7 @@
           <a:p>
             <a:fld id="{17E70EF3-18A7-4644-8DA2-1EB9CA66C736}" type="datetime1">
               <a:rPr lang="en-CA" smtClean="0"/>
-              <a:t>2020-09-18</a:t>
+              <a:t>2020-09-19</a:t>
             </a:fld>
             <a:endParaRPr lang="en-US"/>
           </a:p>
@@ -5065,7 +5065,7 @@
           <a:p>
             <a:fld id="{54538FC1-2481-FB4A-91E5-87F3422DE2D5}" type="datetime1">
               <a:rPr lang="en-CA" smtClean="0"/>
-              <a:t>2020-09-18</a:t>
+              <a:t>2020-09-19</a:t>
             </a:fld>
             <a:endParaRPr lang="en-US"/>
           </a:p>
@@ -5206,7 +5206,7 @@
           <a:p>
             <a:fld id="{93D5C515-1622-C840-89B2-A4A55D34866A}" type="datetime1">
               <a:rPr lang="en-CA" smtClean="0"/>
-              <a:t>2020-09-18</a:t>
+              <a:t>2020-09-19</a:t>
             </a:fld>
             <a:endParaRPr lang="en-US"/>
           </a:p>
@@ -5319,7 +5319,7 @@
           <a:p>
             <a:fld id="{B9077E75-6C88-BB47-AC6F-0DCA859E7113}" type="datetime1">
               <a:rPr lang="en-CA" smtClean="0"/>
-              <a:t>2020-09-18</a:t>
+              <a:t>2020-09-19</a:t>
             </a:fld>
             <a:endParaRPr lang="en-US"/>
           </a:p>
@@ -5630,7 +5630,7 @@
           <a:p>
             <a:fld id="{1AD12F8B-7E05-A047-BAC3-EE71BEBBE5BE}" type="datetime1">
               <a:rPr lang="en-CA" smtClean="0"/>
-              <a:t>2020-09-18</a:t>
+              <a:t>2020-09-19</a:t>
             </a:fld>
             <a:endParaRPr lang="en-US"/>
           </a:p>
@@ -5918,7 +5918,7 @@
           <a:p>
             <a:fld id="{C1D9F72A-E93E-B546-8268-6408A6E1DA62}" type="datetime1">
               <a:rPr lang="en-CA" smtClean="0"/>
-              <a:t>2020-09-18</a:t>
+              <a:t>2020-09-19</a:t>
             </a:fld>
             <a:endParaRPr lang="en-US"/>
           </a:p>
@@ -6159,7 +6159,7 @@
           <a:p>
             <a:fld id="{97DF4AC7-DB73-7444-A2A7-FD79FE1A2B2B}" type="datetime1">
               <a:rPr lang="en-CA" smtClean="0"/>
-              <a:t>2020-09-18</a:t>
+              <a:t>2020-09-19</a:t>
             </a:fld>
             <a:endParaRPr lang="en-US"/>
           </a:p>
@@ -6971,67 +6971,6 @@
           </a:prstGeom>
         </p:spPr>
       </p:pic>
-      <p:sp>
-        <p:nvSpPr>
-          <p:cNvPr id="11" name="Rounded Rectangular Callout 10">
-            <a:extLst>
-              <a:ext uri="{FF2B5EF4-FFF2-40B4-BE49-F238E27FC236}">
-                <a16:creationId xmlns:a16="http://schemas.microsoft.com/office/drawing/2014/main" id="{CC34415E-E634-4645-BD9B-D1AE448D0D84}"/>
-              </a:ext>
-            </a:extLst>
-          </p:cNvPr>
-          <p:cNvSpPr/>
-          <p:nvPr/>
-        </p:nvSpPr>
-        <p:spPr>
-          <a:xfrm>
-            <a:off x="7296912" y="493776"/>
-            <a:ext cx="1682496" cy="530352"/>
-          </a:xfrm>
-          <a:prstGeom prst="wedgeRoundRectCallout">
-            <a:avLst>
-              <a:gd name="adj1" fmla="val 39570"/>
-              <a:gd name="adj2" fmla="val 75223"/>
-              <a:gd name="adj3" fmla="val 16667"/>
-            </a:avLst>
-          </a:prstGeom>
-        </p:spPr>
-        <p:style>
-          <a:lnRef idx="2">
-            <a:schemeClr val="accent1">
-              <a:shade val="50000"/>
-            </a:schemeClr>
-          </a:lnRef>
-          <a:fillRef idx="1">
-            <a:schemeClr val="accent1"/>
-          </a:fillRef>
-          <a:effectRef idx="0">
-            <a:schemeClr val="accent1"/>
-          </a:effectRef>
-          <a:fontRef idx="minor">
-            <a:schemeClr val="lt1"/>
-          </a:fontRef>
-        </p:style>
-        <p:txBody>
-          <a:bodyPr rtlCol="0" anchor="ctr"/>
-          <a:lstStyle/>
-          <a:p>
-            <a:pPr algn="ctr"/>
-            <a:r>
-              <a:rPr lang="en-US" dirty="0"/>
-              <a:t>Nope! You don’t know </a:t>
-            </a:r>
-            <a:r>
-              <a:rPr lang="en-US" dirty="0" err="1"/>
-              <a:t>regexps</a:t>
-            </a:r>
-            <a:r>
-              <a:rPr lang="en-US" dirty="0"/>
-              <a:t> (yet)!</a:t>
-            </a:r>
-          </a:p>
-        </p:txBody>
-      </p:sp>
     </p:spTree>
     <p:extLst>
       <p:ext uri="{BB962C8B-B14F-4D97-AF65-F5344CB8AC3E}">
@@ -7185,51 +7124,6 @@
                       </p:childTnLst>
                     </p:cTn>
                   </p:par>
-                  <p:par>
-                    <p:cTn id="15" fill="hold">
-                      <p:stCondLst>
-                        <p:cond delay="indefinite"/>
-                      </p:stCondLst>
-                      <p:childTnLst>
-                        <p:par>
-                          <p:cTn id="16" fill="hold">
-                            <p:stCondLst>
-                              <p:cond delay="0"/>
-                            </p:stCondLst>
-                            <p:childTnLst>
-                              <p:par>
-                                <p:cTn id="17" presetID="1" presetClass="entr" presetSubtype="0" fill="hold" grpId="0" nodeType="clickEffect">
-                                  <p:stCondLst>
-                                    <p:cond delay="0"/>
-                                  </p:stCondLst>
-                                  <p:childTnLst>
-                                    <p:set>
-                                      <p:cBhvr>
-                                        <p:cTn id="18" dur="1" fill="hold">
-                                          <p:stCondLst>
-                                            <p:cond delay="0"/>
-                                          </p:stCondLst>
-                                        </p:cTn>
-                                        <p:tgtEl>
-                                          <p:spTgt spid="11"/>
-                                        </p:tgtEl>
-                                        <p:attrNameLst>
-                                          <p:attrName>style.visibility</p:attrName>
-                                        </p:attrNameLst>
-                                      </p:cBhvr>
-                                      <p:to>
-                                        <p:strVal val="visible"/>
-                                      </p:to>
-                                    </p:set>
-                                  </p:childTnLst>
-                                </p:cTn>
-                              </p:par>
-                            </p:childTnLst>
-                          </p:cTn>
-                        </p:par>
-                      </p:childTnLst>
-                    </p:cTn>
-                  </p:par>
                 </p:childTnLst>
               </p:cTn>
               <p:prevCondLst>
@@ -7251,9 +7145,6 @@
         </p:cTn>
       </p:par>
     </p:tnLst>
-    <p:bldLst>
-      <p:bldP spid="11" grpId="0" animBg="1"/>
-    </p:bldLst>
   </p:timing>
 </p:sld>
 </file>
@@ -8243,8 +8134,8 @@
         </p:nvSpPr>
         <p:spPr>
           <a:xfrm>
-            <a:off x="5425821" y="3830775"/>
-            <a:ext cx="3307842" cy="699971"/>
+            <a:off x="5425821" y="3830776"/>
+            <a:ext cx="3307842" cy="548720"/>
           </a:xfrm>
           <a:prstGeom prst="rect">
             <a:avLst/>
@@ -8276,41 +8167,41 @@
           <a:lstStyle/>
           <a:p>
             <a:r>
-              <a:rPr lang="en-US" dirty="0"/>
+              <a:rPr lang="en-US" sz="1200" dirty="0"/>
               <a:t>Hint: Compare the matching on input strings between the original </a:t>
             </a:r>
             <a:r>
-              <a:rPr lang="en-US" dirty="0" err="1"/>
+              <a:rPr lang="en-US" sz="1200" dirty="0" err="1"/>
               <a:t>regexp</a:t>
             </a:r>
             <a:r>
-              <a:rPr lang="en-US" dirty="0"/>
+              <a:rPr lang="en-US" sz="1200" dirty="0"/>
               <a:t> </a:t>
             </a:r>
             <a:r>
-              <a:rPr lang="en-US" dirty="0" err="1">
+              <a:rPr lang="en-US" sz="1200" dirty="0" err="1">
                 <a:latin typeface="Consolas" panose="020B0609020204030204" pitchFamily="49" charset="0"/>
                 <a:cs typeface="Consolas" panose="020B0609020204030204" pitchFamily="49" charset="0"/>
               </a:rPr>
               <a:t>ac|bc</a:t>
             </a:r>
             <a:r>
-              <a:rPr lang="en-US" dirty="0">
+              <a:rPr lang="en-US" sz="1200" dirty="0">
                 <a:latin typeface="Consolas" panose="020B0609020204030204" pitchFamily="49" charset="0"/>
                 <a:cs typeface="Consolas" panose="020B0609020204030204" pitchFamily="49" charset="0"/>
               </a:rPr>
               <a:t> </a:t>
             </a:r>
             <a:r>
-              <a:rPr lang="en-US" dirty="0"/>
+              <a:rPr lang="en-US" sz="1200" dirty="0"/>
               <a:t>and the 5 unambiguous </a:t>
             </a:r>
             <a:r>
-              <a:rPr lang="en-US" dirty="0" err="1"/>
+              <a:rPr lang="en-US" sz="1200" dirty="0" err="1"/>
               <a:t>regexps</a:t>
             </a:r>
             <a:r>
-              <a:rPr lang="en-US" dirty="0"/>
+              <a:rPr lang="en-US" sz="1200" dirty="0"/>
               <a:t>.</a:t>
             </a:r>
           </a:p>
@@ -8379,6 +8270,98 @@
               </a:rPr>
               <a:t>ab*|c*</a:t>
             </a:r>
+          </a:p>
+        </p:txBody>
+      </p:sp>
+      <p:sp>
+        <p:nvSpPr>
+          <p:cNvPr id="2" name="Right Triangle 1">
+            <a:extLst>
+              <a:ext uri="{FF2B5EF4-FFF2-40B4-BE49-F238E27FC236}">
+                <a16:creationId xmlns:a16="http://schemas.microsoft.com/office/drawing/2014/main" id="{B4BF9D43-1AC9-4D4F-9899-C14EEC116833}"/>
+              </a:ext>
+            </a:extLst>
+          </p:cNvPr>
+          <p:cNvSpPr/>
+          <p:nvPr/>
+        </p:nvSpPr>
+        <p:spPr>
+          <a:xfrm rot="5400000">
+            <a:off x="2799641" y="1934068"/>
+            <a:ext cx="173736" cy="205846"/>
+          </a:xfrm>
+          <a:prstGeom prst="rtTriangle">
+            <a:avLst/>
+          </a:prstGeom>
+        </p:spPr>
+        <p:style>
+          <a:lnRef idx="2">
+            <a:schemeClr val="accent1">
+              <a:shade val="50000"/>
+            </a:schemeClr>
+          </a:lnRef>
+          <a:fillRef idx="1">
+            <a:schemeClr val="accent1"/>
+          </a:fillRef>
+          <a:effectRef idx="0">
+            <a:schemeClr val="accent1"/>
+          </a:effectRef>
+          <a:fontRef idx="minor">
+            <a:schemeClr val="lt1"/>
+          </a:fontRef>
+        </p:style>
+        <p:txBody>
+          <a:bodyPr rtlCol="0" anchor="ctr"/>
+          <a:lstStyle/>
+          <a:p>
+            <a:pPr algn="ctr"/>
+            <a:endParaRPr lang="en-US"/>
+          </a:p>
+        </p:txBody>
+      </p:sp>
+      <p:sp>
+        <p:nvSpPr>
+          <p:cNvPr id="22" name="Right Triangle 21">
+            <a:extLst>
+              <a:ext uri="{FF2B5EF4-FFF2-40B4-BE49-F238E27FC236}">
+                <a16:creationId xmlns:a16="http://schemas.microsoft.com/office/drawing/2014/main" id="{D499B071-DB16-0E48-AB52-197E376F37F2}"/>
+              </a:ext>
+            </a:extLst>
+          </p:cNvPr>
+          <p:cNvSpPr/>
+          <p:nvPr/>
+        </p:nvSpPr>
+        <p:spPr>
+          <a:xfrm rot="5400000">
+            <a:off x="2799641" y="3504386"/>
+            <a:ext cx="173736" cy="205846"/>
+          </a:xfrm>
+          <a:prstGeom prst="rtTriangle">
+            <a:avLst/>
+          </a:prstGeom>
+        </p:spPr>
+        <p:style>
+          <a:lnRef idx="2">
+            <a:schemeClr val="accent1">
+              <a:shade val="50000"/>
+            </a:schemeClr>
+          </a:lnRef>
+          <a:fillRef idx="1">
+            <a:schemeClr val="accent1"/>
+          </a:fillRef>
+          <a:effectRef idx="0">
+            <a:schemeClr val="accent1"/>
+          </a:effectRef>
+          <a:fontRef idx="minor">
+            <a:schemeClr val="lt1"/>
+          </a:fontRef>
+        </p:style>
+        <p:txBody>
+          <a:bodyPr rtlCol="0" anchor="ctr"/>
+          <a:lstStyle/>
+          <a:p>
+            <a:pPr algn="ctr"/>
+            <a:endParaRPr lang="en-US"/>
           </a:p>
         </p:txBody>
       </p:sp>
@@ -8871,7 +8854,7 @@
                                           </p:stCondLst>
                                         </p:cTn>
                                         <p:tgtEl>
-                                          <p:spTgt spid="25"/>
+                                          <p:spTgt spid="2"/>
                                         </p:tgtEl>
                                         <p:attrNameLst>
                                           <p:attrName>style.visibility</p:attrName>
@@ -8916,7 +8899,7 @@
                                           </p:stCondLst>
                                         </p:cTn>
                                         <p:tgtEl>
-                                          <p:spTgt spid="27"/>
+                                          <p:spTgt spid="22"/>
                                         </p:tgtEl>
                                         <p:attrNameLst>
                                           <p:attrName>style.visibility</p:attrName>
@@ -8961,7 +8944,7 @@
                                           </p:stCondLst>
                                         </p:cTn>
                                         <p:tgtEl>
-                                          <p:spTgt spid="28"/>
+                                          <p:spTgt spid="25"/>
                                         </p:tgtEl>
                                         <p:attrNameLst>
                                           <p:attrName>style.visibility</p:attrName>
@@ -8993,7 +8976,7 @@
                             </p:stCondLst>
                             <p:childTnLst>
                               <p:par>
-                                <p:cTn id="57" presetID="1" presetClass="entr" presetSubtype="0" fill="hold" grpId="1" nodeType="clickEffect">
+                                <p:cTn id="57" presetID="1" presetClass="entr" presetSubtype="0" fill="hold" grpId="0" nodeType="clickEffect">
                                   <p:stCondLst>
                                     <p:cond delay="0"/>
                                   </p:stCondLst>
@@ -9006,7 +8989,7 @@
                                           </p:stCondLst>
                                         </p:cTn>
                                         <p:tgtEl>
-                                          <p:spTgt spid="28"/>
+                                          <p:spTgt spid="27"/>
                                         </p:tgtEl>
                                         <p:attrNameLst>
                                           <p:attrName>style.visibility</p:attrName>
@@ -9051,7 +9034,7 @@
                                           </p:stCondLst>
                                         </p:cTn>
                                         <p:tgtEl>
-                                          <p:spTgt spid="29"/>
+                                          <p:spTgt spid="28"/>
                                         </p:tgtEl>
                                         <p:attrNameLst>
                                           <p:attrName>style.visibility</p:attrName>
@@ -9083,7 +9066,7 @@
                             </p:stCondLst>
                             <p:childTnLst>
                               <p:par>
-                                <p:cTn id="65" presetID="1" presetClass="entr" presetSubtype="0" fill="hold" grpId="0" nodeType="clickEffect">
+                                <p:cTn id="65" presetID="1" presetClass="entr" presetSubtype="0" fill="hold" grpId="1" nodeType="clickEffect">
                                   <p:stCondLst>
                                     <p:cond delay="0"/>
                                   </p:stCondLst>
@@ -9096,7 +9079,7 @@
                                           </p:stCondLst>
                                         </p:cTn>
                                         <p:tgtEl>
-                                          <p:spTgt spid="30"/>
+                                          <p:spTgt spid="28"/>
                                         </p:tgtEl>
                                         <p:attrNameLst>
                                           <p:attrName>style.visibility</p:attrName>
@@ -9136,6 +9119,96 @@
                                     <p:set>
                                       <p:cBhvr>
                                         <p:cTn id="70" dur="1" fill="hold">
+                                          <p:stCondLst>
+                                            <p:cond delay="0"/>
+                                          </p:stCondLst>
+                                        </p:cTn>
+                                        <p:tgtEl>
+                                          <p:spTgt spid="29"/>
+                                        </p:tgtEl>
+                                        <p:attrNameLst>
+                                          <p:attrName>style.visibility</p:attrName>
+                                        </p:attrNameLst>
+                                      </p:cBhvr>
+                                      <p:to>
+                                        <p:strVal val="visible"/>
+                                      </p:to>
+                                    </p:set>
+                                  </p:childTnLst>
+                                </p:cTn>
+                              </p:par>
+                            </p:childTnLst>
+                          </p:cTn>
+                        </p:par>
+                      </p:childTnLst>
+                    </p:cTn>
+                  </p:par>
+                  <p:par>
+                    <p:cTn id="71" fill="hold">
+                      <p:stCondLst>
+                        <p:cond delay="indefinite"/>
+                      </p:stCondLst>
+                      <p:childTnLst>
+                        <p:par>
+                          <p:cTn id="72" fill="hold">
+                            <p:stCondLst>
+                              <p:cond delay="0"/>
+                            </p:stCondLst>
+                            <p:childTnLst>
+                              <p:par>
+                                <p:cTn id="73" presetID="1" presetClass="entr" presetSubtype="0" fill="hold" grpId="0" nodeType="clickEffect">
+                                  <p:stCondLst>
+                                    <p:cond delay="0"/>
+                                  </p:stCondLst>
+                                  <p:childTnLst>
+                                    <p:set>
+                                      <p:cBhvr>
+                                        <p:cTn id="74" dur="1" fill="hold">
+                                          <p:stCondLst>
+                                            <p:cond delay="0"/>
+                                          </p:stCondLst>
+                                        </p:cTn>
+                                        <p:tgtEl>
+                                          <p:spTgt spid="30"/>
+                                        </p:tgtEl>
+                                        <p:attrNameLst>
+                                          <p:attrName>style.visibility</p:attrName>
+                                        </p:attrNameLst>
+                                      </p:cBhvr>
+                                      <p:to>
+                                        <p:strVal val="visible"/>
+                                      </p:to>
+                                    </p:set>
+                                  </p:childTnLst>
+                                </p:cTn>
+                              </p:par>
+                            </p:childTnLst>
+                          </p:cTn>
+                        </p:par>
+                      </p:childTnLst>
+                    </p:cTn>
+                  </p:par>
+                  <p:par>
+                    <p:cTn id="75" fill="hold">
+                      <p:stCondLst>
+                        <p:cond delay="indefinite"/>
+                      </p:stCondLst>
+                      <p:childTnLst>
+                        <p:par>
+                          <p:cTn id="76" fill="hold">
+                            <p:stCondLst>
+                              <p:cond delay="0"/>
+                            </p:stCondLst>
+                            <p:childTnLst>
+                              <p:par>
+                                <p:cTn id="77" presetID="1" presetClass="entr" presetSubtype="0" fill="hold" grpId="0" nodeType="clickEffect">
+                                  <p:stCondLst>
+                                    <p:cond delay="0"/>
+                                  </p:stCondLst>
+                                  <p:childTnLst>
+                                    <p:set>
+                                      <p:cBhvr>
+                                        <p:cTn id="78" dur="1" fill="hold">
                                           <p:stCondLst>
                                             <p:cond delay="0"/>
                                           </p:stCondLst>
@@ -9194,6 +9267,8 @@
       <p:bldP spid="29" grpId="0" animBg="1"/>
       <p:bldP spid="30" grpId="0" animBg="1"/>
       <p:bldP spid="20" grpId="0" animBg="1"/>
+      <p:bldP spid="2" grpId="0" animBg="1"/>
+      <p:bldP spid="22" grpId="0" animBg="1"/>
     </p:bldLst>
   </p:timing>
 </p:sld>
@@ -11493,7 +11568,7 @@
             </a:pPr>
             <a:r>
               <a:rPr lang="en-US" dirty="0"/>
-              <a:t>(R|S)|T == R|(S|T) </a:t>
+              <a:t>(RS)T == R(ST)</a:t>
             </a:r>
           </a:p>
           <a:p>
@@ -11507,7 +11582,7 @@
             </a:pPr>
             <a:r>
               <a:rPr lang="en-US" dirty="0"/>
-              <a:t>R|(S|T) == R|S|T</a:t>
+              <a:t>(R|S)|T == R|(S|T) </a:t>
             </a:r>
           </a:p>
           <a:p>
@@ -11521,7 +11596,7 @@
             </a:pPr>
             <a:r>
               <a:rPr lang="en-US" dirty="0"/>
-              <a:t>(RS)T == R(ST)</a:t>
+              <a:t>(R|S) == (S|R)</a:t>
             </a:r>
           </a:p>
           <a:p>
@@ -11535,7 +11610,7 @@
             </a:pPr>
             <a:r>
               <a:rPr lang="en-US" dirty="0"/>
-              <a:t>(R|S) == (S|R)</a:t>
+              <a:t>(R|S)T == (RT|ST)</a:t>
             </a:r>
           </a:p>
           <a:p>
@@ -11549,7 +11624,7 @@
             </a:pPr>
             <a:r>
               <a:rPr lang="en-US" dirty="0"/>
-              <a:t>R*R* == (R*)*</a:t>
+              <a:t>R(S|T) == RS | RT</a:t>
             </a:r>
           </a:p>
           <a:p>
@@ -11563,7 +11638,7 @@
             </a:pPr>
             <a:r>
               <a:rPr lang="en-US" dirty="0"/>
-              <a:t>(R*)* == R*</a:t>
+              <a:t>R == R|R </a:t>
             </a:r>
           </a:p>
           <a:p>
@@ -11577,41 +11652,13 @@
             </a:pPr>
             <a:r>
               <a:rPr lang="en-US" dirty="0"/>
-              <a:t>R* == RR*| </a:t>
+              <a:t>R|R == </a:t>
             </a:r>
             <a:r>
               <a:rPr lang="en-US" dirty="0" err="1"/>
-              <a:t>ε</a:t>
+              <a:t>Rε</a:t>
             </a:r>
             <a:endParaRPr lang="en-US" dirty="0"/>
-          </a:p>
-          <a:p>
-            <a:pPr indent="-257175">
-              <a:lnSpc>
-                <a:spcPct val="100000"/>
-              </a:lnSpc>
-              <a:spcBef>
-                <a:spcPts val="600"/>
-              </a:spcBef>
-            </a:pPr>
-            <a:r>
-              <a:rPr lang="en-US" dirty="0"/>
-              <a:t>R** == R*</a:t>
-            </a:r>
-          </a:p>
-          <a:p>
-            <a:pPr indent="-257175">
-              <a:lnSpc>
-                <a:spcPct val="100000"/>
-              </a:lnSpc>
-              <a:spcBef>
-                <a:spcPts val="600"/>
-              </a:spcBef>
-            </a:pPr>
-            <a:r>
-              <a:rPr lang="en-US" dirty="0"/>
-              <a:t>(R|S)T = (RT|ST)</a:t>
-            </a:r>
           </a:p>
         </p:txBody>
       </p:sp>
@@ -11627,8 +11674,8 @@
         </p:nvSpPr>
         <p:spPr>
           <a:xfrm>
-            <a:off x="4629150" y="1369219"/>
-            <a:ext cx="3886200" cy="3250536"/>
+            <a:off x="4629150" y="1369218"/>
+            <a:ext cx="3886200" cy="3595813"/>
           </a:xfrm>
           <a:prstGeom prst="rect">
             <a:avLst/>
@@ -11654,8 +11701,13 @@
             </a:pPr>
             <a:r>
               <a:rPr lang="en-US" dirty="0"/>
-              <a:t>R(S|T) == RS | RT</a:t>
-            </a:r>
+              <a:t>R* == RR*| </a:t>
+            </a:r>
+            <a:r>
+              <a:rPr lang="en-US" dirty="0" err="1"/>
+              <a:t>ε</a:t>
+            </a:r>
+            <a:endParaRPr lang="en-US" dirty="0"/>
           </a:p>
           <a:p>
             <a:pPr indent="-257175">
@@ -11668,7 +11720,7 @@
             </a:pPr>
             <a:r>
               <a:rPr lang="en-US" dirty="0"/>
-              <a:t>(R|S)* == (R*S*)* </a:t>
+              <a:t>R*R* == (R*)*</a:t>
             </a:r>
           </a:p>
           <a:p>
@@ -11682,7 +11734,7 @@
             </a:pPr>
             <a:r>
               <a:rPr lang="en-US" dirty="0"/>
-              <a:t>(R*S*)* == (R*S)*R* </a:t>
+              <a:t>(R*)* == R*</a:t>
             </a:r>
           </a:p>
           <a:p>
@@ -11696,7 +11748,7 @@
             </a:pPr>
             <a:r>
               <a:rPr lang="en-US" dirty="0"/>
-              <a:t>(R*S)*R* == (R*|S*)*</a:t>
+              <a:t>RR* == R*R</a:t>
             </a:r>
           </a:p>
           <a:p>
@@ -11710,7 +11762,7 @@
             </a:pPr>
             <a:r>
               <a:rPr lang="en-US" dirty="0"/>
-              <a:t>RR* == R*R</a:t>
+              <a:t>(RS)*R == R(SR)*</a:t>
             </a:r>
           </a:p>
           <a:p>
@@ -11724,7 +11776,7 @@
             </a:pPr>
             <a:r>
               <a:rPr lang="en-US" dirty="0"/>
-              <a:t>(RS)*R == R(SR)*</a:t>
+              <a:t>(R|S)* == (R*S*)* </a:t>
             </a:r>
           </a:p>
           <a:p>
@@ -11738,7 +11790,7 @@
             </a:pPr>
             <a:r>
               <a:rPr lang="en-US" dirty="0"/>
-              <a:t>R == R|R </a:t>
+              <a:t>(R*S*)* == (R*S)*R* </a:t>
             </a:r>
           </a:p>
           <a:p>
@@ -11752,13 +11804,8 @@
             </a:pPr>
             <a:r>
               <a:rPr lang="en-US" dirty="0"/>
-              <a:t>R|R = </a:t>
-            </a:r>
-            <a:r>
-              <a:rPr lang="en-US" dirty="0" err="1"/>
-              <a:t>Rε</a:t>
-            </a:r>
-            <a:endParaRPr lang="en-US" dirty="0"/>
+              <a:t>(R*S)*R* == (R*|S*)*</a:t>
+            </a:r>
           </a:p>
         </p:txBody>
       </p:sp>
@@ -11853,7 +11900,7 @@
               <a:buSzPct val="25000"/>
             </a:pPr>
             <a:r>
-              <a:rPr lang="en-US" sz="3000" b="1" dirty="0">
+              <a:rPr lang="en-US" sz="3000" dirty="0">
                 <a:solidFill>
                   <a:schemeClr val="bg1"/>
                 </a:solidFill>
@@ -11863,6 +11910,541 @@
                 <a:sym typeface="Calibri"/>
               </a:rPr>
               <a:t>(0(10)*1)|(01)* == (01)* ?</a:t>
+            </a:r>
+          </a:p>
+        </p:txBody>
+      </p:sp>
+      <p:sp>
+        <p:nvSpPr>
+          <p:cNvPr id="2" name="Rectangle 1">
+            <a:extLst>
+              <a:ext uri="{FF2B5EF4-FFF2-40B4-BE49-F238E27FC236}">
+                <a16:creationId xmlns:a16="http://schemas.microsoft.com/office/drawing/2014/main" id="{F3B7243C-F769-CE47-A3AF-B717C9E4F445}"/>
+              </a:ext>
+            </a:extLst>
+          </p:cNvPr>
+          <p:cNvSpPr/>
+          <p:nvPr/>
+        </p:nvSpPr>
+        <p:spPr>
+          <a:xfrm>
+            <a:off x="628649" y="1435768"/>
+            <a:ext cx="3686678" cy="1074821"/>
+          </a:xfrm>
+          <a:prstGeom prst="rect">
+            <a:avLst/>
+          </a:prstGeom>
+          <a:solidFill>
+            <a:schemeClr val="accent1">
+              <a:lumMod val="20000"/>
+              <a:lumOff val="80000"/>
+              <a:alpha val="20000"/>
+            </a:schemeClr>
+          </a:solidFill>
+          <a:ln>
+            <a:solidFill>
+              <a:schemeClr val="tx1"/>
+            </a:solidFill>
+          </a:ln>
+        </p:spPr>
+        <p:style>
+          <a:lnRef idx="2">
+            <a:schemeClr val="accent1">
+              <a:shade val="50000"/>
+            </a:schemeClr>
+          </a:lnRef>
+          <a:fillRef idx="1">
+            <a:schemeClr val="accent1"/>
+          </a:fillRef>
+          <a:effectRef idx="0">
+            <a:schemeClr val="accent1"/>
+          </a:effectRef>
+          <a:fontRef idx="minor">
+            <a:schemeClr val="lt1"/>
+          </a:fontRef>
+        </p:style>
+        <p:txBody>
+          <a:bodyPr rtlCol="0" anchor="ctr"/>
+          <a:lstStyle/>
+          <a:p>
+            <a:pPr algn="ctr"/>
+            <a:endParaRPr lang="en-US"/>
+          </a:p>
+        </p:txBody>
+      </p:sp>
+      <p:sp>
+        <p:nvSpPr>
+          <p:cNvPr id="8" name="Rectangle 7">
+            <a:extLst>
+              <a:ext uri="{FF2B5EF4-FFF2-40B4-BE49-F238E27FC236}">
+                <a16:creationId xmlns:a16="http://schemas.microsoft.com/office/drawing/2014/main" id="{C34F521F-D5CC-2342-BE49-5C0EA327140A}"/>
+              </a:ext>
+            </a:extLst>
+          </p:cNvPr>
+          <p:cNvSpPr/>
+          <p:nvPr/>
+        </p:nvSpPr>
+        <p:spPr>
+          <a:xfrm>
+            <a:off x="628649" y="2571751"/>
+            <a:ext cx="3686678" cy="765008"/>
+          </a:xfrm>
+          <a:prstGeom prst="rect">
+            <a:avLst/>
+          </a:prstGeom>
+          <a:solidFill>
+            <a:schemeClr val="accent1">
+              <a:lumMod val="20000"/>
+              <a:lumOff val="80000"/>
+              <a:alpha val="20000"/>
+            </a:schemeClr>
+          </a:solidFill>
+          <a:ln>
+            <a:solidFill>
+              <a:schemeClr val="tx1"/>
+            </a:solidFill>
+          </a:ln>
+        </p:spPr>
+        <p:style>
+          <a:lnRef idx="2">
+            <a:schemeClr val="accent1">
+              <a:shade val="50000"/>
+            </a:schemeClr>
+          </a:lnRef>
+          <a:fillRef idx="1">
+            <a:schemeClr val="accent1"/>
+          </a:fillRef>
+          <a:effectRef idx="0">
+            <a:schemeClr val="accent1"/>
+          </a:effectRef>
+          <a:fontRef idx="minor">
+            <a:schemeClr val="lt1"/>
+          </a:fontRef>
+        </p:style>
+        <p:txBody>
+          <a:bodyPr rtlCol="0" anchor="ctr"/>
+          <a:lstStyle/>
+          <a:p>
+            <a:pPr algn="ctr"/>
+            <a:endParaRPr lang="en-US"/>
+          </a:p>
+        </p:txBody>
+      </p:sp>
+      <p:sp>
+        <p:nvSpPr>
+          <p:cNvPr id="9" name="Rectangle 8">
+            <a:extLst>
+              <a:ext uri="{FF2B5EF4-FFF2-40B4-BE49-F238E27FC236}">
+                <a16:creationId xmlns:a16="http://schemas.microsoft.com/office/drawing/2014/main" id="{907610FC-1761-B145-A94A-322DDC9F6018}"/>
+              </a:ext>
+            </a:extLst>
+          </p:cNvPr>
+          <p:cNvSpPr/>
+          <p:nvPr/>
+        </p:nvSpPr>
+        <p:spPr>
+          <a:xfrm>
+            <a:off x="628649" y="3397921"/>
+            <a:ext cx="3686678" cy="708858"/>
+          </a:xfrm>
+          <a:prstGeom prst="rect">
+            <a:avLst/>
+          </a:prstGeom>
+          <a:solidFill>
+            <a:schemeClr val="accent1">
+              <a:lumMod val="20000"/>
+              <a:lumOff val="80000"/>
+              <a:alpha val="20000"/>
+            </a:schemeClr>
+          </a:solidFill>
+          <a:ln>
+            <a:solidFill>
+              <a:schemeClr val="tx1"/>
+            </a:solidFill>
+          </a:ln>
+        </p:spPr>
+        <p:style>
+          <a:lnRef idx="2">
+            <a:schemeClr val="accent1">
+              <a:shade val="50000"/>
+            </a:schemeClr>
+          </a:lnRef>
+          <a:fillRef idx="1">
+            <a:schemeClr val="accent1"/>
+          </a:fillRef>
+          <a:effectRef idx="0">
+            <a:schemeClr val="accent1"/>
+          </a:effectRef>
+          <a:fontRef idx="minor">
+            <a:schemeClr val="lt1"/>
+          </a:fontRef>
+        </p:style>
+        <p:txBody>
+          <a:bodyPr rtlCol="0" anchor="ctr"/>
+          <a:lstStyle/>
+          <a:p>
+            <a:pPr algn="ctr"/>
+            <a:endParaRPr lang="en-US"/>
+          </a:p>
+        </p:txBody>
+      </p:sp>
+      <p:sp>
+        <p:nvSpPr>
+          <p:cNvPr id="3" name="Rounded Rectangle 2">
+            <a:extLst>
+              <a:ext uri="{FF2B5EF4-FFF2-40B4-BE49-F238E27FC236}">
+                <a16:creationId xmlns:a16="http://schemas.microsoft.com/office/drawing/2014/main" id="{1FDE0A5D-6D47-C847-83F5-3FE6047B4649}"/>
+              </a:ext>
+            </a:extLst>
+          </p:cNvPr>
+          <p:cNvSpPr/>
+          <p:nvPr/>
+        </p:nvSpPr>
+        <p:spPr>
+          <a:xfrm>
+            <a:off x="3003887" y="1516668"/>
+            <a:ext cx="1195136" cy="241509"/>
+          </a:xfrm>
+          <a:prstGeom prst="roundRect">
+            <a:avLst/>
+          </a:prstGeom>
+        </p:spPr>
+        <p:style>
+          <a:lnRef idx="2">
+            <a:schemeClr val="accent1">
+              <a:shade val="50000"/>
+            </a:schemeClr>
+          </a:lnRef>
+          <a:fillRef idx="1">
+            <a:schemeClr val="accent1"/>
+          </a:fillRef>
+          <a:effectRef idx="0">
+            <a:schemeClr val="accent1"/>
+          </a:effectRef>
+          <a:fontRef idx="minor">
+            <a:schemeClr val="lt1"/>
+          </a:fontRef>
+        </p:style>
+        <p:txBody>
+          <a:bodyPr rtlCol="0" anchor="ctr"/>
+          <a:lstStyle/>
+          <a:p>
+            <a:pPr algn="ctr"/>
+            <a:r>
+              <a:rPr lang="en-US" dirty="0"/>
+              <a:t>Commutative</a:t>
+            </a:r>
+          </a:p>
+        </p:txBody>
+      </p:sp>
+      <p:sp>
+        <p:nvSpPr>
+          <p:cNvPr id="11" name="Rounded Rectangle 10">
+            <a:extLst>
+              <a:ext uri="{FF2B5EF4-FFF2-40B4-BE49-F238E27FC236}">
+                <a16:creationId xmlns:a16="http://schemas.microsoft.com/office/drawing/2014/main" id="{7AA472C9-EA71-434B-9596-A2FB0460666F}"/>
+              </a:ext>
+            </a:extLst>
+          </p:cNvPr>
+          <p:cNvSpPr/>
+          <p:nvPr/>
+        </p:nvSpPr>
+        <p:spPr>
+          <a:xfrm>
+            <a:off x="3003887" y="2645285"/>
+            <a:ext cx="1195136" cy="241509"/>
+          </a:xfrm>
+          <a:prstGeom prst="roundRect">
+            <a:avLst/>
+          </a:prstGeom>
+        </p:spPr>
+        <p:style>
+          <a:lnRef idx="2">
+            <a:schemeClr val="accent1">
+              <a:shade val="50000"/>
+            </a:schemeClr>
+          </a:lnRef>
+          <a:fillRef idx="1">
+            <a:schemeClr val="accent1"/>
+          </a:fillRef>
+          <a:effectRef idx="0">
+            <a:schemeClr val="accent1"/>
+          </a:effectRef>
+          <a:fontRef idx="minor">
+            <a:schemeClr val="lt1"/>
+          </a:fontRef>
+        </p:style>
+        <p:txBody>
+          <a:bodyPr rtlCol="0" anchor="ctr"/>
+          <a:lstStyle/>
+          <a:p>
+            <a:pPr algn="ctr"/>
+            <a:r>
+              <a:rPr lang="en-US" dirty="0"/>
+              <a:t>Factor</a:t>
+            </a:r>
+          </a:p>
+        </p:txBody>
+      </p:sp>
+      <p:sp>
+        <p:nvSpPr>
+          <p:cNvPr id="12" name="Rounded Rectangle 11">
+            <a:extLst>
+              <a:ext uri="{FF2B5EF4-FFF2-40B4-BE49-F238E27FC236}">
+                <a16:creationId xmlns:a16="http://schemas.microsoft.com/office/drawing/2014/main" id="{5083AA01-A2D2-834B-8173-3CF70A41151B}"/>
+              </a:ext>
+            </a:extLst>
+          </p:cNvPr>
+          <p:cNvSpPr/>
+          <p:nvPr/>
+        </p:nvSpPr>
+        <p:spPr>
+          <a:xfrm>
+            <a:off x="3003887" y="3458074"/>
+            <a:ext cx="1195136" cy="241509"/>
+          </a:xfrm>
+          <a:prstGeom prst="roundRect">
+            <a:avLst/>
+          </a:prstGeom>
+        </p:spPr>
+        <p:style>
+          <a:lnRef idx="2">
+            <a:schemeClr val="accent1">
+              <a:shade val="50000"/>
+            </a:schemeClr>
+          </a:lnRef>
+          <a:fillRef idx="1">
+            <a:schemeClr val="accent1"/>
+          </a:fillRef>
+          <a:effectRef idx="0">
+            <a:schemeClr val="accent1"/>
+          </a:effectRef>
+          <a:fontRef idx="minor">
+            <a:schemeClr val="lt1"/>
+          </a:fontRef>
+        </p:style>
+        <p:txBody>
+          <a:bodyPr rtlCol="0" anchor="ctr"/>
+          <a:lstStyle/>
+          <a:p>
+            <a:pPr algn="ctr"/>
+            <a:r>
+              <a:rPr lang="en-US" dirty="0"/>
+              <a:t>Redundant</a:t>
+            </a:r>
+          </a:p>
+        </p:txBody>
+      </p:sp>
+      <p:sp>
+        <p:nvSpPr>
+          <p:cNvPr id="13" name="Rectangle 12">
+            <a:extLst>
+              <a:ext uri="{FF2B5EF4-FFF2-40B4-BE49-F238E27FC236}">
+                <a16:creationId xmlns:a16="http://schemas.microsoft.com/office/drawing/2014/main" id="{7EAE4D27-784C-2246-9E17-C5A1C642FAC9}"/>
+              </a:ext>
+            </a:extLst>
+          </p:cNvPr>
+          <p:cNvSpPr/>
+          <p:nvPr/>
+        </p:nvSpPr>
+        <p:spPr>
+          <a:xfrm>
+            <a:off x="4629150" y="1435768"/>
+            <a:ext cx="3686678" cy="1098661"/>
+          </a:xfrm>
+          <a:prstGeom prst="rect">
+            <a:avLst/>
+          </a:prstGeom>
+          <a:solidFill>
+            <a:schemeClr val="accent1">
+              <a:lumMod val="20000"/>
+              <a:lumOff val="80000"/>
+              <a:alpha val="20000"/>
+            </a:schemeClr>
+          </a:solidFill>
+          <a:ln>
+            <a:solidFill>
+              <a:schemeClr val="tx1"/>
+            </a:solidFill>
+          </a:ln>
+        </p:spPr>
+        <p:style>
+          <a:lnRef idx="2">
+            <a:schemeClr val="accent1">
+              <a:shade val="50000"/>
+            </a:schemeClr>
+          </a:lnRef>
+          <a:fillRef idx="1">
+            <a:schemeClr val="accent1"/>
+          </a:fillRef>
+          <a:effectRef idx="0">
+            <a:schemeClr val="accent1"/>
+          </a:effectRef>
+          <a:fontRef idx="minor">
+            <a:schemeClr val="lt1"/>
+          </a:fontRef>
+        </p:style>
+        <p:txBody>
+          <a:bodyPr rtlCol="0" anchor="ctr"/>
+          <a:lstStyle/>
+          <a:p>
+            <a:pPr algn="ctr"/>
+            <a:endParaRPr lang="en-US"/>
+          </a:p>
+        </p:txBody>
+      </p:sp>
+      <p:sp>
+        <p:nvSpPr>
+          <p:cNvPr id="14" name="Rounded Rectangle 13">
+            <a:extLst>
+              <a:ext uri="{FF2B5EF4-FFF2-40B4-BE49-F238E27FC236}">
+                <a16:creationId xmlns:a16="http://schemas.microsoft.com/office/drawing/2014/main" id="{88E09129-F2A1-314D-80F9-3B0B042742ED}"/>
+              </a:ext>
+            </a:extLst>
+          </p:cNvPr>
+          <p:cNvSpPr/>
+          <p:nvPr/>
+        </p:nvSpPr>
+        <p:spPr>
+          <a:xfrm>
+            <a:off x="6978316" y="1486745"/>
+            <a:ext cx="1195136" cy="241509"/>
+          </a:xfrm>
+          <a:prstGeom prst="roundRect">
+            <a:avLst/>
+          </a:prstGeom>
+        </p:spPr>
+        <p:style>
+          <a:lnRef idx="2">
+            <a:schemeClr val="accent1">
+              <a:shade val="50000"/>
+            </a:schemeClr>
+          </a:lnRef>
+          <a:fillRef idx="1">
+            <a:schemeClr val="accent1"/>
+          </a:fillRef>
+          <a:effectRef idx="0">
+            <a:schemeClr val="accent1"/>
+          </a:effectRef>
+          <a:fontRef idx="minor">
+            <a:schemeClr val="lt1"/>
+          </a:fontRef>
+        </p:style>
+        <p:txBody>
+          <a:bodyPr rtlCol="0" anchor="ctr"/>
+          <a:lstStyle/>
+          <a:p>
+            <a:pPr algn="ctr"/>
+            <a:r>
+              <a:rPr lang="en-US" dirty="0"/>
+              <a:t>Closure</a:t>
+            </a:r>
+          </a:p>
+        </p:txBody>
+      </p:sp>
+      <p:sp>
+        <p:nvSpPr>
+          <p:cNvPr id="15" name="Rectangle 14">
+            <a:extLst>
+              <a:ext uri="{FF2B5EF4-FFF2-40B4-BE49-F238E27FC236}">
+                <a16:creationId xmlns:a16="http://schemas.microsoft.com/office/drawing/2014/main" id="{1187B107-462E-E045-AAA0-3C655086D1EB}"/>
+              </a:ext>
+            </a:extLst>
+          </p:cNvPr>
+          <p:cNvSpPr/>
+          <p:nvPr/>
+        </p:nvSpPr>
+        <p:spPr>
+          <a:xfrm>
+            <a:off x="4629150" y="2600979"/>
+            <a:ext cx="3686678" cy="1885637"/>
+          </a:xfrm>
+          <a:prstGeom prst="rect">
+            <a:avLst/>
+          </a:prstGeom>
+          <a:solidFill>
+            <a:schemeClr val="accent1">
+              <a:lumMod val="20000"/>
+              <a:lumOff val="80000"/>
+              <a:alpha val="20000"/>
+            </a:schemeClr>
+          </a:solidFill>
+          <a:ln>
+            <a:solidFill>
+              <a:schemeClr val="tx1"/>
+            </a:solidFill>
+          </a:ln>
+        </p:spPr>
+        <p:style>
+          <a:lnRef idx="2">
+            <a:schemeClr val="accent1">
+              <a:shade val="50000"/>
+            </a:schemeClr>
+          </a:lnRef>
+          <a:fillRef idx="1">
+            <a:schemeClr val="accent1"/>
+          </a:fillRef>
+          <a:effectRef idx="0">
+            <a:schemeClr val="accent1"/>
+          </a:effectRef>
+          <a:fontRef idx="minor">
+            <a:schemeClr val="lt1"/>
+          </a:fontRef>
+        </p:style>
+        <p:txBody>
+          <a:bodyPr rtlCol="0" anchor="ctr"/>
+          <a:lstStyle/>
+          <a:p>
+            <a:pPr algn="ctr"/>
+            <a:endParaRPr lang="en-US"/>
+          </a:p>
+        </p:txBody>
+      </p:sp>
+      <p:sp>
+        <p:nvSpPr>
+          <p:cNvPr id="16" name="Rounded Rectangle 15">
+            <a:extLst>
+              <a:ext uri="{FF2B5EF4-FFF2-40B4-BE49-F238E27FC236}">
+                <a16:creationId xmlns:a16="http://schemas.microsoft.com/office/drawing/2014/main" id="{5533F072-692F-A34F-9D44-A99E817C26AA}"/>
+              </a:ext>
+            </a:extLst>
+          </p:cNvPr>
+          <p:cNvSpPr/>
+          <p:nvPr/>
+        </p:nvSpPr>
+        <p:spPr>
+          <a:xfrm>
+            <a:off x="6978316" y="2660027"/>
+            <a:ext cx="1195136" cy="241509"/>
+          </a:xfrm>
+          <a:prstGeom prst="roundRect">
+            <a:avLst/>
+          </a:prstGeom>
+        </p:spPr>
+        <p:style>
+          <a:lnRef idx="2">
+            <a:schemeClr val="accent1">
+              <a:shade val="50000"/>
+            </a:schemeClr>
+          </a:lnRef>
+          <a:fillRef idx="1">
+            <a:schemeClr val="accent1"/>
+          </a:fillRef>
+          <a:effectRef idx="0">
+            <a:schemeClr val="accent1"/>
+          </a:effectRef>
+          <a:fontRef idx="minor">
+            <a:schemeClr val="lt1"/>
+          </a:fontRef>
+        </p:style>
+        <p:txBody>
+          <a:bodyPr rtlCol="0" anchor="ctr"/>
+          <a:lstStyle/>
+          <a:p>
+            <a:pPr algn="ctr"/>
+            <a:r>
+              <a:rPr lang="en-US" dirty="0"/>
+              <a:t>Reorder</a:t>
             </a:r>
           </a:p>
         </p:txBody>
@@ -12053,11 +12635,7 @@
                                           </p:stCondLst>
                                         </p:cTn>
                                         <p:tgtEl>
-                                          <p:spTgt spid="209">
-                                            <p:txEl>
-                                              <p:pRg st="3" end="3"/>
-                                            </p:txEl>
-                                          </p:spTgt>
+                                          <p:spTgt spid="2"/>
                                         </p:tgtEl>
                                         <p:attrNameLst>
                                           <p:attrName>style.visibility</p:attrName>
@@ -12102,11 +12680,7 @@
                                           </p:stCondLst>
                                         </p:cTn>
                                         <p:tgtEl>
-                                          <p:spTgt spid="209">
-                                            <p:txEl>
-                                              <p:pRg st="4" end="4"/>
-                                            </p:txEl>
-                                          </p:spTgt>
+                                          <p:spTgt spid="3"/>
                                         </p:tgtEl>
                                         <p:attrNameLst>
                                           <p:attrName>style.visibility</p:attrName>
@@ -12153,7 +12727,7 @@
                                         <p:tgtEl>
                                           <p:spTgt spid="209">
                                             <p:txEl>
-                                              <p:pRg st="5" end="5"/>
+                                              <p:pRg st="3" end="3"/>
                                             </p:txEl>
                                           </p:spTgt>
                                         </p:tgtEl>
@@ -12202,7 +12776,7 @@
                                         <p:tgtEl>
                                           <p:spTgt spid="209">
                                             <p:txEl>
-                                              <p:pRg st="6" end="6"/>
+                                              <p:pRg st="4" end="4"/>
                                             </p:txEl>
                                           </p:spTgt>
                                         </p:tgtEl>
@@ -12249,11 +12823,7 @@
                                           </p:stCondLst>
                                         </p:cTn>
                                         <p:tgtEl>
-                                          <p:spTgt spid="209">
-                                            <p:txEl>
-                                              <p:pRg st="7" end="7"/>
-                                            </p:txEl>
-                                          </p:spTgt>
+                                          <p:spTgt spid="8"/>
                                         </p:tgtEl>
                                         <p:attrNameLst>
                                           <p:attrName>style.visibility</p:attrName>
@@ -12298,11 +12868,7 @@
                                           </p:stCondLst>
                                         </p:cTn>
                                         <p:tgtEl>
-                                          <p:spTgt spid="209">
-                                            <p:txEl>
-                                              <p:pRg st="8" end="8"/>
-                                            </p:txEl>
-                                          </p:spTgt>
+                                          <p:spTgt spid="11"/>
                                         </p:tgtEl>
                                         <p:attrNameLst>
                                           <p:attrName>style.visibility</p:attrName>
@@ -12347,9 +12913,9 @@
                                           </p:stCondLst>
                                         </p:cTn>
                                         <p:tgtEl>
-                                          <p:spTgt spid="210">
+                                          <p:spTgt spid="209">
                                             <p:txEl>
-                                              <p:pRg st="0" end="0"/>
+                                              <p:pRg st="5" end="5"/>
                                             </p:txEl>
                                           </p:spTgt>
                                         </p:tgtEl>
@@ -12396,9 +12962,9 @@
                                           </p:stCondLst>
                                         </p:cTn>
                                         <p:tgtEl>
-                                          <p:spTgt spid="210">
+                                          <p:spTgt spid="209">
                                             <p:txEl>
-                                              <p:pRg st="1" end="1"/>
+                                              <p:pRg st="6" end="6"/>
                                             </p:txEl>
                                           </p:spTgt>
                                         </p:tgtEl>
@@ -12445,11 +13011,7 @@
                                           </p:stCondLst>
                                         </p:cTn>
                                         <p:tgtEl>
-                                          <p:spTgt spid="210">
-                                            <p:txEl>
-                                              <p:pRg st="2" end="2"/>
-                                            </p:txEl>
-                                          </p:spTgt>
+                                          <p:spTgt spid="9"/>
                                         </p:tgtEl>
                                         <p:attrNameLst>
                                           <p:attrName>style.visibility</p:attrName>
@@ -12494,11 +13056,7 @@
                                           </p:stCondLst>
                                         </p:cTn>
                                         <p:tgtEl>
-                                          <p:spTgt spid="210">
-                                            <p:txEl>
-                                              <p:pRg st="3" end="3"/>
-                                            </p:txEl>
-                                          </p:spTgt>
+                                          <p:spTgt spid="12"/>
                                         </p:tgtEl>
                                         <p:attrNameLst>
                                           <p:attrName>style.visibility</p:attrName>
@@ -12545,7 +13103,7 @@
                                         <p:tgtEl>
                                           <p:spTgt spid="210">
                                             <p:txEl>
-                                              <p:pRg st="4" end="4"/>
+                                              <p:pRg st="0" end="0"/>
                                             </p:txEl>
                                           </p:spTgt>
                                         </p:tgtEl>
@@ -12594,7 +13152,7 @@
                                         <p:tgtEl>
                                           <p:spTgt spid="210">
                                             <p:txEl>
-                                              <p:pRg st="5" end="5"/>
+                                              <p:pRg st="1" end="1"/>
                                             </p:txEl>
                                           </p:spTgt>
                                         </p:tgtEl>
@@ -12643,7 +13201,7 @@
                                         <p:tgtEl>
                                           <p:spTgt spid="210">
                                             <p:txEl>
-                                              <p:pRg st="6" end="6"/>
+                                              <p:pRg st="2" end="2"/>
                                             </p:txEl>
                                           </p:spTgt>
                                         </p:tgtEl>
@@ -12690,11 +13248,387 @@
                                           </p:stCondLst>
                                         </p:cTn>
                                         <p:tgtEl>
+                                          <p:spTgt spid="13"/>
+                                        </p:tgtEl>
+                                        <p:attrNameLst>
+                                          <p:attrName>style.visibility</p:attrName>
+                                        </p:attrNameLst>
+                                      </p:cBhvr>
+                                      <p:to>
+                                        <p:strVal val="visible"/>
+                                      </p:to>
+                                    </p:set>
+                                  </p:childTnLst>
+                                </p:cTn>
+                              </p:par>
+                            </p:childTnLst>
+                          </p:cTn>
+                        </p:par>
+                      </p:childTnLst>
+                    </p:cTn>
+                  </p:par>
+                  <p:par>
+                    <p:cTn id="71" fill="hold">
+                      <p:stCondLst>
+                        <p:cond delay="indefinite"/>
+                      </p:stCondLst>
+                      <p:childTnLst>
+                        <p:par>
+                          <p:cTn id="72" fill="hold">
+                            <p:stCondLst>
+                              <p:cond delay="0"/>
+                            </p:stCondLst>
+                            <p:childTnLst>
+                              <p:par>
+                                <p:cTn id="73" presetID="1" presetClass="entr" presetSubtype="0" fill="hold" grpId="0" nodeType="clickEffect">
+                                  <p:stCondLst>
+                                    <p:cond delay="0"/>
+                                  </p:stCondLst>
+                                  <p:childTnLst>
+                                    <p:set>
+                                      <p:cBhvr>
+                                        <p:cTn id="74" dur="1" fill="hold">
+                                          <p:stCondLst>
+                                            <p:cond delay="0"/>
+                                          </p:stCondLst>
+                                        </p:cTn>
+                                        <p:tgtEl>
+                                          <p:spTgt spid="14"/>
+                                        </p:tgtEl>
+                                        <p:attrNameLst>
+                                          <p:attrName>style.visibility</p:attrName>
+                                        </p:attrNameLst>
+                                      </p:cBhvr>
+                                      <p:to>
+                                        <p:strVal val="visible"/>
+                                      </p:to>
+                                    </p:set>
+                                  </p:childTnLst>
+                                </p:cTn>
+                              </p:par>
+                            </p:childTnLst>
+                          </p:cTn>
+                        </p:par>
+                      </p:childTnLst>
+                    </p:cTn>
+                  </p:par>
+                  <p:par>
+                    <p:cTn id="75" fill="hold">
+                      <p:stCondLst>
+                        <p:cond delay="indefinite"/>
+                      </p:stCondLst>
+                      <p:childTnLst>
+                        <p:par>
+                          <p:cTn id="76" fill="hold">
+                            <p:stCondLst>
+                              <p:cond delay="0"/>
+                            </p:stCondLst>
+                            <p:childTnLst>
+                              <p:par>
+                                <p:cTn id="77" presetID="1" presetClass="entr" presetSubtype="0" fill="hold" grpId="0" nodeType="clickEffect">
+                                  <p:stCondLst>
+                                    <p:cond delay="0"/>
+                                  </p:stCondLst>
+                                  <p:childTnLst>
+                                    <p:set>
+                                      <p:cBhvr>
+                                        <p:cTn id="78" dur="1" fill="hold">
+                                          <p:stCondLst>
+                                            <p:cond delay="0"/>
+                                          </p:stCondLst>
+                                        </p:cTn>
+                                        <p:tgtEl>
+                                          <p:spTgt spid="210">
+                                            <p:txEl>
+                                              <p:pRg st="3" end="3"/>
+                                            </p:txEl>
+                                          </p:spTgt>
+                                        </p:tgtEl>
+                                        <p:attrNameLst>
+                                          <p:attrName>style.visibility</p:attrName>
+                                        </p:attrNameLst>
+                                      </p:cBhvr>
+                                      <p:to>
+                                        <p:strVal val="visible"/>
+                                      </p:to>
+                                    </p:set>
+                                  </p:childTnLst>
+                                </p:cTn>
+                              </p:par>
+                            </p:childTnLst>
+                          </p:cTn>
+                        </p:par>
+                      </p:childTnLst>
+                    </p:cTn>
+                  </p:par>
+                  <p:par>
+                    <p:cTn id="79" fill="hold">
+                      <p:stCondLst>
+                        <p:cond delay="indefinite"/>
+                      </p:stCondLst>
+                      <p:childTnLst>
+                        <p:par>
+                          <p:cTn id="80" fill="hold">
+                            <p:stCondLst>
+                              <p:cond delay="0"/>
+                            </p:stCondLst>
+                            <p:childTnLst>
+                              <p:par>
+                                <p:cTn id="81" presetID="1" presetClass="entr" presetSubtype="0" fill="hold" grpId="0" nodeType="clickEffect">
+                                  <p:stCondLst>
+                                    <p:cond delay="0"/>
+                                  </p:stCondLst>
+                                  <p:childTnLst>
+                                    <p:set>
+                                      <p:cBhvr>
+                                        <p:cTn id="82" dur="1" fill="hold">
+                                          <p:stCondLst>
+                                            <p:cond delay="0"/>
+                                          </p:stCondLst>
+                                        </p:cTn>
+                                        <p:tgtEl>
+                                          <p:spTgt spid="210">
+                                            <p:txEl>
+                                              <p:pRg st="4" end="4"/>
+                                            </p:txEl>
+                                          </p:spTgt>
+                                        </p:tgtEl>
+                                        <p:attrNameLst>
+                                          <p:attrName>style.visibility</p:attrName>
+                                        </p:attrNameLst>
+                                      </p:cBhvr>
+                                      <p:to>
+                                        <p:strVal val="visible"/>
+                                      </p:to>
+                                    </p:set>
+                                  </p:childTnLst>
+                                </p:cTn>
+                              </p:par>
+                            </p:childTnLst>
+                          </p:cTn>
+                        </p:par>
+                      </p:childTnLst>
+                    </p:cTn>
+                  </p:par>
+                  <p:par>
+                    <p:cTn id="83" fill="hold">
+                      <p:stCondLst>
+                        <p:cond delay="indefinite"/>
+                      </p:stCondLst>
+                      <p:childTnLst>
+                        <p:par>
+                          <p:cTn id="84" fill="hold">
+                            <p:stCondLst>
+                              <p:cond delay="0"/>
+                            </p:stCondLst>
+                            <p:childTnLst>
+                              <p:par>
+                                <p:cTn id="85" presetID="1" presetClass="entr" presetSubtype="0" fill="hold" grpId="0" nodeType="clickEffect">
+                                  <p:stCondLst>
+                                    <p:cond delay="0"/>
+                                  </p:stCondLst>
+                                  <p:childTnLst>
+                                    <p:set>
+                                      <p:cBhvr>
+                                        <p:cTn id="86" dur="1" fill="hold">
+                                          <p:stCondLst>
+                                            <p:cond delay="0"/>
+                                          </p:stCondLst>
+                                        </p:cTn>
+                                        <p:tgtEl>
+                                          <p:spTgt spid="210">
+                                            <p:txEl>
+                                              <p:pRg st="5" end="5"/>
+                                            </p:txEl>
+                                          </p:spTgt>
+                                        </p:tgtEl>
+                                        <p:attrNameLst>
+                                          <p:attrName>style.visibility</p:attrName>
+                                        </p:attrNameLst>
+                                      </p:cBhvr>
+                                      <p:to>
+                                        <p:strVal val="visible"/>
+                                      </p:to>
+                                    </p:set>
+                                  </p:childTnLst>
+                                </p:cTn>
+                              </p:par>
+                            </p:childTnLst>
+                          </p:cTn>
+                        </p:par>
+                      </p:childTnLst>
+                    </p:cTn>
+                  </p:par>
+                  <p:par>
+                    <p:cTn id="87" fill="hold">
+                      <p:stCondLst>
+                        <p:cond delay="indefinite"/>
+                      </p:stCondLst>
+                      <p:childTnLst>
+                        <p:par>
+                          <p:cTn id="88" fill="hold">
+                            <p:stCondLst>
+                              <p:cond delay="0"/>
+                            </p:stCondLst>
+                            <p:childTnLst>
+                              <p:par>
+                                <p:cTn id="89" presetID="1" presetClass="entr" presetSubtype="0" fill="hold" grpId="0" nodeType="clickEffect">
+                                  <p:stCondLst>
+                                    <p:cond delay="0"/>
+                                  </p:stCondLst>
+                                  <p:childTnLst>
+                                    <p:set>
+                                      <p:cBhvr>
+                                        <p:cTn id="90" dur="1" fill="hold">
+                                          <p:stCondLst>
+                                            <p:cond delay="0"/>
+                                          </p:stCondLst>
+                                        </p:cTn>
+                                        <p:tgtEl>
+                                          <p:spTgt spid="210">
+                                            <p:txEl>
+                                              <p:pRg st="6" end="6"/>
+                                            </p:txEl>
+                                          </p:spTgt>
+                                        </p:tgtEl>
+                                        <p:attrNameLst>
+                                          <p:attrName>style.visibility</p:attrName>
+                                        </p:attrNameLst>
+                                      </p:cBhvr>
+                                      <p:to>
+                                        <p:strVal val="visible"/>
+                                      </p:to>
+                                    </p:set>
+                                  </p:childTnLst>
+                                </p:cTn>
+                              </p:par>
+                            </p:childTnLst>
+                          </p:cTn>
+                        </p:par>
+                      </p:childTnLst>
+                    </p:cTn>
+                  </p:par>
+                  <p:par>
+                    <p:cTn id="91" fill="hold">
+                      <p:stCondLst>
+                        <p:cond delay="indefinite"/>
+                      </p:stCondLst>
+                      <p:childTnLst>
+                        <p:par>
+                          <p:cTn id="92" fill="hold">
+                            <p:stCondLst>
+                              <p:cond delay="0"/>
+                            </p:stCondLst>
+                            <p:childTnLst>
+                              <p:par>
+                                <p:cTn id="93" presetID="1" presetClass="entr" presetSubtype="0" fill="hold" grpId="0" nodeType="clickEffect">
+                                  <p:stCondLst>
+                                    <p:cond delay="0"/>
+                                  </p:stCondLst>
+                                  <p:childTnLst>
+                                    <p:set>
+                                      <p:cBhvr>
+                                        <p:cTn id="94" dur="1" fill="hold">
+                                          <p:stCondLst>
+                                            <p:cond delay="0"/>
+                                          </p:stCondLst>
+                                        </p:cTn>
+                                        <p:tgtEl>
                                           <p:spTgt spid="210">
                                             <p:txEl>
                                               <p:pRg st="7" end="7"/>
                                             </p:txEl>
                                           </p:spTgt>
+                                        </p:tgtEl>
+                                        <p:attrNameLst>
+                                          <p:attrName>style.visibility</p:attrName>
+                                        </p:attrNameLst>
+                                      </p:cBhvr>
+                                      <p:to>
+                                        <p:strVal val="visible"/>
+                                      </p:to>
+                                    </p:set>
+                                  </p:childTnLst>
+                                </p:cTn>
+                              </p:par>
+                            </p:childTnLst>
+                          </p:cTn>
+                        </p:par>
+                      </p:childTnLst>
+                    </p:cTn>
+                  </p:par>
+                  <p:par>
+                    <p:cTn id="95" fill="hold">
+                      <p:stCondLst>
+                        <p:cond delay="indefinite"/>
+                      </p:stCondLst>
+                      <p:childTnLst>
+                        <p:par>
+                          <p:cTn id="96" fill="hold">
+                            <p:stCondLst>
+                              <p:cond delay="0"/>
+                            </p:stCondLst>
+                            <p:childTnLst>
+                              <p:par>
+                                <p:cTn id="97" presetID="1" presetClass="entr" presetSubtype="0" fill="hold" grpId="0" nodeType="clickEffect">
+                                  <p:stCondLst>
+                                    <p:cond delay="0"/>
+                                  </p:stCondLst>
+                                  <p:childTnLst>
+                                    <p:set>
+                                      <p:cBhvr>
+                                        <p:cTn id="98" dur="1" fill="hold">
+                                          <p:stCondLst>
+                                            <p:cond delay="0"/>
+                                          </p:stCondLst>
+                                        </p:cTn>
+                                        <p:tgtEl>
+                                          <p:spTgt spid="15"/>
+                                        </p:tgtEl>
+                                        <p:attrNameLst>
+                                          <p:attrName>style.visibility</p:attrName>
+                                        </p:attrNameLst>
+                                      </p:cBhvr>
+                                      <p:to>
+                                        <p:strVal val="visible"/>
+                                      </p:to>
+                                    </p:set>
+                                  </p:childTnLst>
+                                </p:cTn>
+                              </p:par>
+                            </p:childTnLst>
+                          </p:cTn>
+                        </p:par>
+                      </p:childTnLst>
+                    </p:cTn>
+                  </p:par>
+                  <p:par>
+                    <p:cTn id="99" fill="hold">
+                      <p:stCondLst>
+                        <p:cond delay="indefinite"/>
+                      </p:stCondLst>
+                      <p:childTnLst>
+                        <p:par>
+                          <p:cTn id="100" fill="hold">
+                            <p:stCondLst>
+                              <p:cond delay="0"/>
+                            </p:stCondLst>
+                            <p:childTnLst>
+                              <p:par>
+                                <p:cTn id="101" presetID="1" presetClass="entr" presetSubtype="0" fill="hold" grpId="0" nodeType="clickEffect">
+                                  <p:stCondLst>
+                                    <p:cond delay="0"/>
+                                  </p:stCondLst>
+                                  <p:childTnLst>
+                                    <p:set>
+                                      <p:cBhvr>
+                                        <p:cTn id="102" dur="1" fill="hold">
+                                          <p:stCondLst>
+                                            <p:cond delay="0"/>
+                                          </p:stCondLst>
+                                        </p:cTn>
+                                        <p:tgtEl>
+                                          <p:spTgt spid="16"/>
                                         </p:tgtEl>
                                         <p:attrNameLst>
                                           <p:attrName>style.visibility</p:attrName>
@@ -12736,7 +13670,17 @@
     </p:tnLst>
     <p:bldLst>
       <p:bldP spid="209" grpId="0" build="p"/>
-      <p:bldP spid="210" grpId="0" build="p"/>
+      <p:bldP spid="210" grpId="0" uiExpand="1" build="p"/>
+      <p:bldP spid="2" grpId="0" animBg="1"/>
+      <p:bldP spid="8" grpId="0" animBg="1"/>
+      <p:bldP spid="9" grpId="0" animBg="1"/>
+      <p:bldP spid="3" grpId="0" animBg="1"/>
+      <p:bldP spid="11" grpId="0" animBg="1"/>
+      <p:bldP spid="12" grpId="0" animBg="1"/>
+      <p:bldP spid="13" grpId="0" animBg="1"/>
+      <p:bldP spid="14" grpId="0" animBg="1"/>
+      <p:bldP spid="15" grpId="0" animBg="1"/>
+      <p:bldP spid="16" grpId="0" animBg="1"/>
     </p:bldLst>
   </p:timing>
 </p:sld>
@@ -12885,7 +13829,7 @@
               <a:buSzPct val="25000"/>
             </a:pPr>
             <a:r>
-              <a:rPr lang="en-US" sz="3000" b="1" dirty="0">
+              <a:rPr lang="en-US" sz="3000" dirty="0">
                 <a:solidFill>
                   <a:schemeClr val="bg1"/>
                 </a:solidFill>
@@ -13365,22 +14309,22 @@
             <a:r>
               <a:rPr lang="en-US" sz="2400" dirty="0">
                 <a:solidFill>
-                  <a:srgbClr val="C00000"/>
-                </a:solidFill>
-              </a:rPr>
-              <a:t>(RS)*R </a:t>
-            </a:r>
-            <a:r>
-              <a:rPr lang="en-US" sz="2400" dirty="0"/>
-              <a:t>== </a:t>
-            </a:r>
-            <a:r>
-              <a:rPr lang="en-US" sz="2400" dirty="0">
-                <a:solidFill>
                   <a:schemeClr val="accent2">
                     <a:lumMod val="60000"/>
                     <a:lumOff val="40000"/>
                   </a:schemeClr>
+                </a:solidFill>
+              </a:rPr>
+              <a:t>(RS)*R </a:t>
+            </a:r>
+            <a:r>
+              <a:rPr lang="en-US" sz="2400" dirty="0"/>
+              <a:t>== </a:t>
+            </a:r>
+            <a:r>
+              <a:rPr lang="en-US" sz="2400" dirty="0">
+                <a:solidFill>
+                  <a:srgbClr val="C00000"/>
                 </a:solidFill>
               </a:rPr>
               <a:t>R(SR)*</a:t>
@@ -14189,11 +15133,7 @@
                                           </p:stCondLst>
                                         </p:cTn>
                                         <p:tgtEl>
-                                          <p:spTgt spid="219">
-                                            <p:txEl>
-                                              <p:pRg st="7" end="7"/>
-                                            </p:txEl>
-                                          </p:spTgt>
+                                          <p:spTgt spid="11"/>
                                         </p:tgtEl>
                                         <p:attrNameLst>
                                           <p:attrName>style.visibility</p:attrName>
@@ -14233,6 +15173,55 @@
                                     <p:set>
                                       <p:cBhvr>
                                         <p:cTn id="50" dur="1" fill="hold">
+                                          <p:stCondLst>
+                                            <p:cond delay="0"/>
+                                          </p:stCondLst>
+                                        </p:cTn>
+                                        <p:tgtEl>
+                                          <p:spTgt spid="219">
+                                            <p:txEl>
+                                              <p:pRg st="7" end="7"/>
+                                            </p:txEl>
+                                          </p:spTgt>
+                                        </p:tgtEl>
+                                        <p:attrNameLst>
+                                          <p:attrName>style.visibility</p:attrName>
+                                        </p:attrNameLst>
+                                      </p:cBhvr>
+                                      <p:to>
+                                        <p:strVal val="visible"/>
+                                      </p:to>
+                                    </p:set>
+                                  </p:childTnLst>
+                                </p:cTn>
+                              </p:par>
+                            </p:childTnLst>
+                          </p:cTn>
+                        </p:par>
+                      </p:childTnLst>
+                    </p:cTn>
+                  </p:par>
+                  <p:par>
+                    <p:cTn id="51" fill="hold">
+                      <p:stCondLst>
+                        <p:cond delay="indefinite"/>
+                      </p:stCondLst>
+                      <p:childTnLst>
+                        <p:par>
+                          <p:cTn id="52" fill="hold">
+                            <p:stCondLst>
+                              <p:cond delay="0"/>
+                            </p:stCondLst>
+                            <p:childTnLst>
+                              <p:par>
+                                <p:cTn id="53" presetID="1" presetClass="entr" presetSubtype="0" fill="hold" grpId="0" nodeType="clickEffect">
+                                  <p:stCondLst>
+                                    <p:cond delay="0"/>
+                                  </p:stCondLst>
+                                  <p:childTnLst>
+                                    <p:set>
+                                      <p:cBhvr>
+                                        <p:cTn id="54" dur="1" fill="hold">
                                           <p:stCondLst>
                                             <p:cond delay="0"/>
                                           </p:stCondLst>
@@ -14283,6 +15272,7 @@
       <p:bldP spid="3" grpId="0" animBg="1"/>
       <p:bldP spid="9" grpId="0" animBg="1"/>
       <p:bldP spid="10" grpId="0" animBg="1"/>
+      <p:bldP spid="11" grpId="0" animBg="1"/>
       <p:bldP spid="12" grpId="0" animBg="1"/>
     </p:bldLst>
   </p:timing>

</xml_diff>